<commit_message>
finalized plotting & feature engineering
</commit_message>
<xml_diff>
--- a/Documentation.pptx
+++ b/Documentation.pptx
@@ -8,29 +8,23 @@
     <p:sldId id="256" r:id="rId2"/>
     <p:sldId id="257" r:id="rId3"/>
     <p:sldId id="258" r:id="rId4"/>
-    <p:sldId id="259" r:id="rId5"/>
-    <p:sldId id="261" r:id="rId6"/>
-    <p:sldId id="262" r:id="rId7"/>
-    <p:sldId id="263" r:id="rId8"/>
-    <p:sldId id="264" r:id="rId9"/>
-    <p:sldId id="265" r:id="rId10"/>
-    <p:sldId id="266" r:id="rId11"/>
-    <p:sldId id="267" r:id="rId12"/>
-    <p:sldId id="269" r:id="rId13"/>
-    <p:sldId id="270" r:id="rId14"/>
-    <p:sldId id="272" r:id="rId15"/>
-    <p:sldId id="273" r:id="rId16"/>
-    <p:sldId id="274" r:id="rId17"/>
-    <p:sldId id="275" r:id="rId18"/>
-    <p:sldId id="276" r:id="rId19"/>
-    <p:sldId id="277" r:id="rId20"/>
-    <p:sldId id="278" r:id="rId21"/>
-    <p:sldId id="279" r:id="rId22"/>
-    <p:sldId id="280" r:id="rId23"/>
-    <p:sldId id="281" r:id="rId24"/>
-    <p:sldId id="282" r:id="rId25"/>
-    <p:sldId id="283" r:id="rId26"/>
-    <p:sldId id="284" r:id="rId27"/>
+    <p:sldId id="285" r:id="rId5"/>
+    <p:sldId id="287" r:id="rId6"/>
+    <p:sldId id="288" r:id="rId7"/>
+    <p:sldId id="286" r:id="rId8"/>
+    <p:sldId id="272" r:id="rId9"/>
+    <p:sldId id="273" r:id="rId10"/>
+    <p:sldId id="274" r:id="rId11"/>
+    <p:sldId id="275" r:id="rId12"/>
+    <p:sldId id="289" r:id="rId13"/>
+    <p:sldId id="290" r:id="rId14"/>
+    <p:sldId id="291" r:id="rId15"/>
+    <p:sldId id="292" r:id="rId16"/>
+    <p:sldId id="293" r:id="rId17"/>
+    <p:sldId id="294" r:id="rId18"/>
+    <p:sldId id="295" r:id="rId19"/>
+    <p:sldId id="296" r:id="rId20"/>
+    <p:sldId id="298" r:id="rId21"/>
   </p:sldIdLst>
   <p:sldSz cx="12192000" cy="6858000"/>
   <p:notesSz cx="6858000" cy="9144000"/>
@@ -132,7 +126,7 @@
   <p:extLst>
     <p:ext uri="{521415D9-36F7-43E2-AB2F-B90AF26B5E84}">
       <p14:sectionLst xmlns:p14="http://schemas.microsoft.com/office/powerpoint/2010/main">
-        <p14:section name="Default Section" id="{E5E14E52-7F44-4CA4-8127-71E0E920E906}">
+        <p14:section name="Introduction" id="{E5E14E52-7F44-4CA4-8127-71E0E920E906}">
           <p14:sldIdLst>
             <p14:sldId id="256"/>
             <p14:sldId id="257"/>
@@ -141,16 +135,10 @@
         </p14:section>
         <p14:section name="Data Pre-processing" id="{FBBCBBA7-688A-48E2-8283-5AA6C8001391}">
           <p14:sldIdLst>
-            <p14:sldId id="259"/>
-            <p14:sldId id="261"/>
-            <p14:sldId id="262"/>
-            <p14:sldId id="263"/>
-            <p14:sldId id="264"/>
-            <p14:sldId id="265"/>
-            <p14:sldId id="266"/>
-            <p14:sldId id="267"/>
-            <p14:sldId id="269"/>
-            <p14:sldId id="270"/>
+            <p14:sldId id="285"/>
+            <p14:sldId id="287"/>
+            <p14:sldId id="288"/>
+            <p14:sldId id="286"/>
           </p14:sldIdLst>
         </p14:section>
         <p14:section name="Plotting" id="{CD4932FF-A861-4AF6-89F4-AC0CDD242074}">
@@ -159,15 +147,19 @@
             <p14:sldId id="273"/>
             <p14:sldId id="274"/>
             <p14:sldId id="275"/>
-            <p14:sldId id="276"/>
-            <p14:sldId id="277"/>
-            <p14:sldId id="278"/>
-            <p14:sldId id="279"/>
-            <p14:sldId id="280"/>
-            <p14:sldId id="281"/>
-            <p14:sldId id="282"/>
-            <p14:sldId id="283"/>
-            <p14:sldId id="284"/>
+            <p14:sldId id="289"/>
+            <p14:sldId id="290"/>
+          </p14:sldIdLst>
+        </p14:section>
+        <p14:section name="Feature Engineering" id="{ADE6FA6F-7ED2-46FE-AA5E-0F80E17ABC02}">
+          <p14:sldIdLst>
+            <p14:sldId id="291"/>
+            <p14:sldId id="292"/>
+            <p14:sldId id="293"/>
+            <p14:sldId id="294"/>
+            <p14:sldId id="295"/>
+            <p14:sldId id="296"/>
+            <p14:sldId id="298"/>
           </p14:sldIdLst>
         </p14:section>
       </p14:sectionLst>
@@ -328,7 +320,7 @@
           <a:p>
             <a:fld id="{16D657CA-F8EC-4C87-9515-8E77A9C1CB63}" type="datetimeFigureOut">
               <a:rPr lang="en-PH" smtClean="0"/>
-              <a:t>17/03/2024</a:t>
+              <a:t>21/03/2024</a:t>
             </a:fld>
             <a:endParaRPr lang="en-PH"/>
           </a:p>
@@ -528,7 +520,7 @@
           <a:p>
             <a:fld id="{16D657CA-F8EC-4C87-9515-8E77A9C1CB63}" type="datetimeFigureOut">
               <a:rPr lang="en-PH" smtClean="0"/>
-              <a:t>17/03/2024</a:t>
+              <a:t>21/03/2024</a:t>
             </a:fld>
             <a:endParaRPr lang="en-PH"/>
           </a:p>
@@ -738,7 +730,7 @@
           <a:p>
             <a:fld id="{16D657CA-F8EC-4C87-9515-8E77A9C1CB63}" type="datetimeFigureOut">
               <a:rPr lang="en-PH" smtClean="0"/>
-              <a:t>17/03/2024</a:t>
+              <a:t>21/03/2024</a:t>
             </a:fld>
             <a:endParaRPr lang="en-PH"/>
           </a:p>
@@ -938,7 +930,7 @@
           <a:p>
             <a:fld id="{16D657CA-F8EC-4C87-9515-8E77A9C1CB63}" type="datetimeFigureOut">
               <a:rPr lang="en-PH" smtClean="0"/>
-              <a:t>17/03/2024</a:t>
+              <a:t>21/03/2024</a:t>
             </a:fld>
             <a:endParaRPr lang="en-PH"/>
           </a:p>
@@ -1214,7 +1206,7 @@
           <a:p>
             <a:fld id="{16D657CA-F8EC-4C87-9515-8E77A9C1CB63}" type="datetimeFigureOut">
               <a:rPr lang="en-PH" smtClean="0"/>
-              <a:t>17/03/2024</a:t>
+              <a:t>21/03/2024</a:t>
             </a:fld>
             <a:endParaRPr lang="en-PH"/>
           </a:p>
@@ -1482,7 +1474,7 @@
           <a:p>
             <a:fld id="{16D657CA-F8EC-4C87-9515-8E77A9C1CB63}" type="datetimeFigureOut">
               <a:rPr lang="en-PH" smtClean="0"/>
-              <a:t>17/03/2024</a:t>
+              <a:t>21/03/2024</a:t>
             </a:fld>
             <a:endParaRPr lang="en-PH"/>
           </a:p>
@@ -1897,7 +1889,7 @@
           <a:p>
             <a:fld id="{16D657CA-F8EC-4C87-9515-8E77A9C1CB63}" type="datetimeFigureOut">
               <a:rPr lang="en-PH" smtClean="0"/>
-              <a:t>17/03/2024</a:t>
+              <a:t>21/03/2024</a:t>
             </a:fld>
             <a:endParaRPr lang="en-PH"/>
           </a:p>
@@ -2039,7 +2031,7 @@
           <a:p>
             <a:fld id="{16D657CA-F8EC-4C87-9515-8E77A9C1CB63}" type="datetimeFigureOut">
               <a:rPr lang="en-PH" smtClean="0"/>
-              <a:t>17/03/2024</a:t>
+              <a:t>21/03/2024</a:t>
             </a:fld>
             <a:endParaRPr lang="en-PH"/>
           </a:p>
@@ -2152,7 +2144,7 @@
           <a:p>
             <a:fld id="{16D657CA-F8EC-4C87-9515-8E77A9C1CB63}" type="datetimeFigureOut">
               <a:rPr lang="en-PH" smtClean="0"/>
-              <a:t>17/03/2024</a:t>
+              <a:t>21/03/2024</a:t>
             </a:fld>
             <a:endParaRPr lang="en-PH"/>
           </a:p>
@@ -2465,7 +2457,7 @@
           <a:p>
             <a:fld id="{16D657CA-F8EC-4C87-9515-8E77A9C1CB63}" type="datetimeFigureOut">
               <a:rPr lang="en-PH" smtClean="0"/>
-              <a:t>17/03/2024</a:t>
+              <a:t>21/03/2024</a:t>
             </a:fld>
             <a:endParaRPr lang="en-PH"/>
           </a:p>
@@ -2754,7 +2746,7 @@
           <a:p>
             <a:fld id="{16D657CA-F8EC-4C87-9515-8E77A9C1CB63}" type="datetimeFigureOut">
               <a:rPr lang="en-PH" smtClean="0"/>
-              <a:t>17/03/2024</a:t>
+              <a:t>21/03/2024</a:t>
             </a:fld>
             <a:endParaRPr lang="en-PH"/>
           </a:p>
@@ -2997,7 +2989,7 @@
           <a:p>
             <a:fld id="{16D657CA-F8EC-4C87-9515-8E77A9C1CB63}" type="datetimeFigureOut">
               <a:rPr lang="en-PH" smtClean="0"/>
-              <a:t>17/03/2024</a:t>
+              <a:t>21/03/2024</a:t>
             </a:fld>
             <a:endParaRPr lang="en-PH"/>
           </a:p>
@@ -3572,40 +3564,12 @@
           <a:chExt cx="0" cy="0"/>
         </a:xfrm>
       </p:grpSpPr>
-      <p:sp>
-        <p:nvSpPr>
-          <p:cNvPr id="2" name="Title 1">
-            <a:extLst>
-              <a:ext uri="{FF2B5EF4-FFF2-40B4-BE49-F238E27FC236}">
-                <a16:creationId xmlns:a16="http://schemas.microsoft.com/office/drawing/2014/main" id="{717114C5-A6FF-4070-A155-C5B2EB3967C5}"/>
-              </a:ext>
-            </a:extLst>
-          </p:cNvPr>
-          <p:cNvSpPr>
-            <a:spLocks noGrp="1"/>
-          </p:cNvSpPr>
-          <p:nvPr>
-            <p:ph type="title"/>
-          </p:nvPr>
-        </p:nvSpPr>
-        <p:spPr/>
-        <p:txBody>
-          <a:bodyPr/>
-          <a:lstStyle/>
-          <a:p>
-            <a:r>
-              <a:rPr lang="en-PH" dirty="0"/>
-              <a:t>Data pre-processing</a:t>
-            </a:r>
-          </a:p>
-        </p:txBody>
-      </p:sp>
       <p:pic>
         <p:nvPicPr>
-          <p:cNvPr id="8" name="Picture 7">
-            <a:extLst>
-              <a:ext uri="{FF2B5EF4-FFF2-40B4-BE49-F238E27FC236}">
-                <a16:creationId xmlns:a16="http://schemas.microsoft.com/office/drawing/2014/main" id="{E62848E4-D1BE-4CBE-8369-614C19A25597}"/>
+          <p:cNvPr id="5" name="Picture 4">
+            <a:extLst>
+              <a:ext uri="{FF2B5EF4-FFF2-40B4-BE49-F238E27FC236}">
+                <a16:creationId xmlns:a16="http://schemas.microsoft.com/office/drawing/2014/main" id="{DD5FE30A-D47C-362B-4FAF-BC37564CAEDA}"/>
               </a:ext>
             </a:extLst>
           </p:cNvPr>
@@ -3622,8 +3586,38 @@
         </p:blipFill>
         <p:spPr>
           <a:xfrm>
-            <a:off x="281436" y="2038229"/>
-            <a:ext cx="11629128" cy="2781541"/>
+            <a:off x="356548" y="299564"/>
+            <a:ext cx="7414903" cy="3596952"/>
+          </a:xfrm>
+          <a:prstGeom prst="rect">
+            <a:avLst/>
+          </a:prstGeom>
+        </p:spPr>
+      </p:pic>
+      <p:pic>
+        <p:nvPicPr>
+          <p:cNvPr id="7" name="Picture 6">
+            <a:extLst>
+              <a:ext uri="{FF2B5EF4-FFF2-40B4-BE49-F238E27FC236}">
+                <a16:creationId xmlns:a16="http://schemas.microsoft.com/office/drawing/2014/main" id="{0A44001B-4A21-D5B7-315C-B13BD0FCB658}"/>
+              </a:ext>
+            </a:extLst>
+          </p:cNvPr>
+          <p:cNvPicPr>
+            <a:picLocks noChangeAspect="1"/>
+          </p:cNvPicPr>
+          <p:nvPr/>
+        </p:nvPicPr>
+        <p:blipFill>
+          <a:blip r:embed="rId3"/>
+          <a:stretch>
+            <a:fillRect/>
+          </a:stretch>
+        </p:blipFill>
+        <p:spPr>
+          <a:xfrm>
+            <a:off x="7367070" y="4500858"/>
+            <a:ext cx="4610500" cy="2057578"/>
           </a:xfrm>
           <a:prstGeom prst="rect">
             <a:avLst/>
@@ -3633,7 +3627,7 @@
     </p:spTree>
     <p:extLst>
       <p:ext uri="{BB962C8B-B14F-4D97-AF65-F5344CB8AC3E}">
-        <p14:creationId xmlns:p14="http://schemas.microsoft.com/office/powerpoint/2010/main" val="359222648"/>
+        <p14:creationId xmlns:p14="http://schemas.microsoft.com/office/powerpoint/2010/main" val="1669009406"/>
       </p:ext>
     </p:extLst>
   </p:cSld>
@@ -3660,40 +3654,12 @@
           <a:chExt cx="0" cy="0"/>
         </a:xfrm>
       </p:grpSpPr>
-      <p:sp>
-        <p:nvSpPr>
-          <p:cNvPr id="2" name="Title 1">
-            <a:extLst>
-              <a:ext uri="{FF2B5EF4-FFF2-40B4-BE49-F238E27FC236}">
-                <a16:creationId xmlns:a16="http://schemas.microsoft.com/office/drawing/2014/main" id="{717114C5-A6FF-4070-A155-C5B2EB3967C5}"/>
-              </a:ext>
-            </a:extLst>
-          </p:cNvPr>
-          <p:cNvSpPr>
-            <a:spLocks noGrp="1"/>
-          </p:cNvSpPr>
-          <p:nvPr>
-            <p:ph type="title"/>
-          </p:nvPr>
-        </p:nvSpPr>
-        <p:spPr/>
-        <p:txBody>
-          <a:bodyPr/>
-          <a:lstStyle/>
-          <a:p>
-            <a:r>
-              <a:rPr lang="en-PH" dirty="0"/>
-              <a:t>Data pre-processing</a:t>
-            </a:r>
-          </a:p>
-        </p:txBody>
-      </p:sp>
       <p:pic>
         <p:nvPicPr>
-          <p:cNvPr id="4" name="Picture 3">
-            <a:extLst>
-              <a:ext uri="{FF2B5EF4-FFF2-40B4-BE49-F238E27FC236}">
-                <a16:creationId xmlns:a16="http://schemas.microsoft.com/office/drawing/2014/main" id="{05BA0621-FC5F-22B3-EDDB-CC72D13AFE6F}"/>
+          <p:cNvPr id="5" name="Picture 4">
+            <a:extLst>
+              <a:ext uri="{FF2B5EF4-FFF2-40B4-BE49-F238E27FC236}">
+                <a16:creationId xmlns:a16="http://schemas.microsoft.com/office/drawing/2014/main" id="{CB8DF81F-5F76-1CE7-D99A-06E74C9C6025}"/>
               </a:ext>
             </a:extLst>
           </p:cNvPr>
@@ -3710,8 +3676,38 @@
         </p:blipFill>
         <p:spPr>
           <a:xfrm>
-            <a:off x="921714" y="1484439"/>
-            <a:ext cx="7056732" cy="4397121"/>
+            <a:off x="204146" y="208121"/>
+            <a:ext cx="7475868" cy="3657917"/>
+          </a:xfrm>
+          <a:prstGeom prst="rect">
+            <a:avLst/>
+          </a:prstGeom>
+        </p:spPr>
+      </p:pic>
+      <p:pic>
+        <p:nvPicPr>
+          <p:cNvPr id="7" name="Picture 6">
+            <a:extLst>
+              <a:ext uri="{FF2B5EF4-FFF2-40B4-BE49-F238E27FC236}">
+                <a16:creationId xmlns:a16="http://schemas.microsoft.com/office/drawing/2014/main" id="{3D9CC17E-8959-499A-BF26-75E7F72AB86C}"/>
+              </a:ext>
+            </a:extLst>
+          </p:cNvPr>
+          <p:cNvPicPr>
+            <a:picLocks noChangeAspect="1"/>
+          </p:cNvPicPr>
+          <p:nvPr/>
+        </p:nvPicPr>
+        <p:blipFill>
+          <a:blip r:embed="rId3"/>
+          <a:stretch>
+            <a:fillRect/>
+          </a:stretch>
+        </p:blipFill>
+        <p:spPr>
+          <a:xfrm>
+            <a:off x="6096000" y="3667619"/>
+            <a:ext cx="5918500" cy="3063540"/>
           </a:xfrm>
           <a:prstGeom prst="rect">
             <a:avLst/>
@@ -3721,7 +3717,7 @@
     </p:spTree>
     <p:extLst>
       <p:ext uri="{BB962C8B-B14F-4D97-AF65-F5344CB8AC3E}">
-        <p14:creationId xmlns:p14="http://schemas.microsoft.com/office/powerpoint/2010/main" val="4061836947"/>
+        <p14:creationId xmlns:p14="http://schemas.microsoft.com/office/powerpoint/2010/main" val="373864505"/>
       </p:ext>
     </p:extLst>
   </p:cSld>
@@ -3748,40 +3744,12 @@
           <a:chExt cx="0" cy="0"/>
         </a:xfrm>
       </p:grpSpPr>
-      <p:sp>
-        <p:nvSpPr>
-          <p:cNvPr id="2" name="Title 1">
-            <a:extLst>
-              <a:ext uri="{FF2B5EF4-FFF2-40B4-BE49-F238E27FC236}">
-                <a16:creationId xmlns:a16="http://schemas.microsoft.com/office/drawing/2014/main" id="{717114C5-A6FF-4070-A155-C5B2EB3967C5}"/>
-              </a:ext>
-            </a:extLst>
-          </p:cNvPr>
-          <p:cNvSpPr>
-            <a:spLocks noGrp="1"/>
-          </p:cNvSpPr>
-          <p:nvPr>
-            <p:ph type="title"/>
-          </p:nvPr>
-        </p:nvSpPr>
-        <p:spPr/>
-        <p:txBody>
-          <a:bodyPr/>
-          <a:lstStyle/>
-          <a:p>
-            <a:r>
-              <a:rPr lang="en-PH" dirty="0"/>
-              <a:t>Data pre-processing</a:t>
-            </a:r>
-          </a:p>
-        </p:txBody>
-      </p:sp>
       <p:pic>
         <p:nvPicPr>
-          <p:cNvPr id="5" name="Picture 4">
-            <a:extLst>
-              <a:ext uri="{FF2B5EF4-FFF2-40B4-BE49-F238E27FC236}">
-                <a16:creationId xmlns:a16="http://schemas.microsoft.com/office/drawing/2014/main" id="{ECC5DB70-F49E-241D-C7D7-58853C1ADD04}"/>
+          <p:cNvPr id="7" name="Picture 6">
+            <a:extLst>
+              <a:ext uri="{FF2B5EF4-FFF2-40B4-BE49-F238E27FC236}">
+                <a16:creationId xmlns:a16="http://schemas.microsoft.com/office/drawing/2014/main" id="{96F83E4D-A7EA-4A68-F987-D5B61B59891E}"/>
               </a:ext>
             </a:extLst>
           </p:cNvPr>
@@ -3798,8 +3766,38 @@
         </p:blipFill>
         <p:spPr>
           <a:xfrm>
-            <a:off x="838200" y="1690688"/>
-            <a:ext cx="6645216" cy="2598645"/>
+            <a:off x="228092" y="185339"/>
+            <a:ext cx="5867908" cy="1874682"/>
+          </a:xfrm>
+          <a:prstGeom prst="rect">
+            <a:avLst/>
+          </a:prstGeom>
+        </p:spPr>
+      </p:pic>
+      <p:pic>
+        <p:nvPicPr>
+          <p:cNvPr id="5" name="Picture 4">
+            <a:extLst>
+              <a:ext uri="{FF2B5EF4-FFF2-40B4-BE49-F238E27FC236}">
+                <a16:creationId xmlns:a16="http://schemas.microsoft.com/office/drawing/2014/main" id="{1B1565C6-C712-73FC-4C05-0526AC2BBC5B}"/>
+              </a:ext>
+            </a:extLst>
+          </p:cNvPr>
+          <p:cNvPicPr>
+            <a:picLocks noChangeAspect="1"/>
+          </p:cNvPicPr>
+          <p:nvPr/>
+        </p:nvPicPr>
+        <p:blipFill>
+          <a:blip r:embed="rId3"/>
+          <a:stretch>
+            <a:fillRect/>
+          </a:stretch>
+        </p:blipFill>
+        <p:spPr>
+          <a:xfrm>
+            <a:off x="4671141" y="1356505"/>
+            <a:ext cx="7292767" cy="5316156"/>
           </a:xfrm>
           <a:prstGeom prst="rect">
             <a:avLst/>
@@ -3809,7 +3807,7 @@
     </p:spTree>
     <p:extLst>
       <p:ext uri="{BB962C8B-B14F-4D97-AF65-F5344CB8AC3E}">
-        <p14:creationId xmlns:p14="http://schemas.microsoft.com/office/powerpoint/2010/main" val="1808396716"/>
+        <p14:creationId xmlns:p14="http://schemas.microsoft.com/office/powerpoint/2010/main" val="3446772751"/>
       </p:ext>
     </p:extLst>
   </p:cSld>
@@ -3836,40 +3834,12 @@
           <a:chExt cx="0" cy="0"/>
         </a:xfrm>
       </p:grpSpPr>
-      <p:sp>
-        <p:nvSpPr>
-          <p:cNvPr id="2" name="Title 1">
-            <a:extLst>
-              <a:ext uri="{FF2B5EF4-FFF2-40B4-BE49-F238E27FC236}">
-                <a16:creationId xmlns:a16="http://schemas.microsoft.com/office/drawing/2014/main" id="{717114C5-A6FF-4070-A155-C5B2EB3967C5}"/>
-              </a:ext>
-            </a:extLst>
-          </p:cNvPr>
-          <p:cNvSpPr>
-            <a:spLocks noGrp="1"/>
-          </p:cNvSpPr>
-          <p:nvPr>
-            <p:ph type="title"/>
-          </p:nvPr>
-        </p:nvSpPr>
-        <p:spPr/>
-        <p:txBody>
-          <a:bodyPr/>
-          <a:lstStyle/>
-          <a:p>
-            <a:r>
-              <a:rPr lang="en-PH" dirty="0"/>
-              <a:t>Data pre-processing</a:t>
-            </a:r>
-          </a:p>
-        </p:txBody>
-      </p:sp>
       <p:pic>
         <p:nvPicPr>
-          <p:cNvPr id="4" name="Picture 3">
-            <a:extLst>
-              <a:ext uri="{FF2B5EF4-FFF2-40B4-BE49-F238E27FC236}">
-                <a16:creationId xmlns:a16="http://schemas.microsoft.com/office/drawing/2014/main" id="{4FCC9F86-4385-278B-B882-133B6E7D6791}"/>
+          <p:cNvPr id="5" name="Picture 4">
+            <a:extLst>
+              <a:ext uri="{FF2B5EF4-FFF2-40B4-BE49-F238E27FC236}">
+                <a16:creationId xmlns:a16="http://schemas.microsoft.com/office/drawing/2014/main" id="{D4BC07F0-974B-EAFB-CD60-3E1898FBA0BC}"/>
               </a:ext>
             </a:extLst>
           </p:cNvPr>
@@ -3886,8 +3856,38 @@
         </p:blipFill>
         <p:spPr>
           <a:xfrm>
-            <a:off x="838200" y="1690688"/>
-            <a:ext cx="6706181" cy="2225233"/>
+            <a:off x="359064" y="728752"/>
+            <a:ext cx="7697131" cy="5072608"/>
+          </a:xfrm>
+          <a:prstGeom prst="rect">
+            <a:avLst/>
+          </a:prstGeom>
+        </p:spPr>
+      </p:pic>
+      <p:pic>
+        <p:nvPicPr>
+          <p:cNvPr id="9" name="Picture 8">
+            <a:extLst>
+              <a:ext uri="{FF2B5EF4-FFF2-40B4-BE49-F238E27FC236}">
+                <a16:creationId xmlns:a16="http://schemas.microsoft.com/office/drawing/2014/main" id="{6C078BAF-2C1B-8FAA-D617-841476CE4B39}"/>
+              </a:ext>
+            </a:extLst>
+          </p:cNvPr>
+          <p:cNvPicPr>
+            <a:picLocks noChangeAspect="1"/>
+          </p:cNvPicPr>
+          <p:nvPr/>
+        </p:nvPicPr>
+        <p:blipFill>
+          <a:blip r:embed="rId3"/>
+          <a:stretch>
+            <a:fillRect/>
+          </a:stretch>
+        </p:blipFill>
+        <p:spPr>
+          <a:xfrm>
+            <a:off x="8138062" y="141976"/>
+            <a:ext cx="2560418" cy="6574048"/>
           </a:xfrm>
           <a:prstGeom prst="rect">
             <a:avLst/>
@@ -3897,7 +3897,7 @@
     </p:spTree>
     <p:extLst>
       <p:ext uri="{BB962C8B-B14F-4D97-AF65-F5344CB8AC3E}">
-        <p14:creationId xmlns:p14="http://schemas.microsoft.com/office/powerpoint/2010/main" val="316020390"/>
+        <p14:creationId xmlns:p14="http://schemas.microsoft.com/office/powerpoint/2010/main" val="2231394118"/>
       </p:ext>
     </p:extLst>
   </p:cSld>
@@ -3929,7 +3929,7 @@
           <p:cNvPr id="5" name="Picture 4">
             <a:extLst>
               <a:ext uri="{FF2B5EF4-FFF2-40B4-BE49-F238E27FC236}">
-                <a16:creationId xmlns:a16="http://schemas.microsoft.com/office/drawing/2014/main" id="{295708D7-925F-796F-6515-66ABFF5A87BB}"/>
+                <a16:creationId xmlns:a16="http://schemas.microsoft.com/office/drawing/2014/main" id="{01281793-4973-0FDD-D768-A368F2ACCAC8}"/>
               </a:ext>
             </a:extLst>
           </p:cNvPr>
@@ -3946,8 +3946,8 @@
         </p:blipFill>
         <p:spPr>
           <a:xfrm>
-            <a:off x="295586" y="217013"/>
-            <a:ext cx="7475868" cy="3619814"/>
+            <a:off x="98759" y="112858"/>
+            <a:ext cx="6934801" cy="3970364"/>
           </a:xfrm>
           <a:prstGeom prst="rect">
             <a:avLst/>
@@ -3959,7 +3959,7 @@
           <p:cNvPr id="7" name="Picture 6">
             <a:extLst>
               <a:ext uri="{FF2B5EF4-FFF2-40B4-BE49-F238E27FC236}">
-                <a16:creationId xmlns:a16="http://schemas.microsoft.com/office/drawing/2014/main" id="{754AF4FE-A6AB-A4F0-C878-4BAE73E2F9FF}"/>
+                <a16:creationId xmlns:a16="http://schemas.microsoft.com/office/drawing/2014/main" id="{6BEDAE93-F34A-6F81-5987-BF1BCA10FE89}"/>
               </a:ext>
             </a:extLst>
           </p:cNvPr>
@@ -3976,8 +3976,8 @@
         </p:blipFill>
         <p:spPr>
           <a:xfrm>
-            <a:off x="6834921" y="4560547"/>
-            <a:ext cx="5044877" cy="2080440"/>
+            <a:off x="5567680" y="1290759"/>
+            <a:ext cx="6411470" cy="5340124"/>
           </a:xfrm>
           <a:prstGeom prst="rect">
             <a:avLst/>
@@ -3987,7 +3987,7 @@
     </p:spTree>
     <p:extLst>
       <p:ext uri="{BB962C8B-B14F-4D97-AF65-F5344CB8AC3E}">
-        <p14:creationId xmlns:p14="http://schemas.microsoft.com/office/powerpoint/2010/main" val="2606317837"/>
+        <p14:creationId xmlns:p14="http://schemas.microsoft.com/office/powerpoint/2010/main" val="2327307042"/>
       </p:ext>
     </p:extLst>
   </p:cSld>
@@ -4019,7 +4019,7 @@
           <p:cNvPr id="5" name="Picture 4">
             <a:extLst>
               <a:ext uri="{FF2B5EF4-FFF2-40B4-BE49-F238E27FC236}">
-                <a16:creationId xmlns:a16="http://schemas.microsoft.com/office/drawing/2014/main" id="{ED4BA3C7-CEAB-3FA2-85A7-4E36E94B97D0}"/>
+                <a16:creationId xmlns:a16="http://schemas.microsoft.com/office/drawing/2014/main" id="{5D1FF0DD-DBB3-A223-8589-45AB66E2CAF1}"/>
               </a:ext>
             </a:extLst>
           </p:cNvPr>
@@ -4036,8 +4036,8 @@
         </p:blipFill>
         <p:spPr>
           <a:xfrm>
-            <a:off x="209227" y="150974"/>
-            <a:ext cx="7445385" cy="3589331"/>
+            <a:off x="176250" y="582683"/>
+            <a:ext cx="6454699" cy="5692633"/>
           </a:xfrm>
           <a:prstGeom prst="rect">
             <a:avLst/>
@@ -4049,7 +4049,7 @@
           <p:cNvPr id="7" name="Picture 6">
             <a:extLst>
               <a:ext uri="{FF2B5EF4-FFF2-40B4-BE49-F238E27FC236}">
-                <a16:creationId xmlns:a16="http://schemas.microsoft.com/office/drawing/2014/main" id="{B18BF684-82AA-6DE6-A0EF-0C0D117889D3}"/>
+                <a16:creationId xmlns:a16="http://schemas.microsoft.com/office/drawing/2014/main" id="{F98DAC73-82A8-BA62-431F-B2DA13D0D0AD}"/>
               </a:ext>
             </a:extLst>
           </p:cNvPr>
@@ -4066,8 +4066,8 @@
         </p:blipFill>
         <p:spPr>
           <a:xfrm>
-            <a:off x="7190534" y="4664689"/>
-            <a:ext cx="4740051" cy="2042337"/>
+            <a:off x="6167120" y="1039922"/>
+            <a:ext cx="5715495" cy="5235394"/>
           </a:xfrm>
           <a:prstGeom prst="rect">
             <a:avLst/>
@@ -4077,7 +4077,7 @@
     </p:spTree>
     <p:extLst>
       <p:ext uri="{BB962C8B-B14F-4D97-AF65-F5344CB8AC3E}">
-        <p14:creationId xmlns:p14="http://schemas.microsoft.com/office/powerpoint/2010/main" val="2967904661"/>
+        <p14:creationId xmlns:p14="http://schemas.microsoft.com/office/powerpoint/2010/main" val="2902278377"/>
       </p:ext>
     </p:extLst>
   </p:cSld>
@@ -4109,7 +4109,7 @@
           <p:cNvPr id="5" name="Picture 4">
             <a:extLst>
               <a:ext uri="{FF2B5EF4-FFF2-40B4-BE49-F238E27FC236}">
-                <a16:creationId xmlns:a16="http://schemas.microsoft.com/office/drawing/2014/main" id="{DD5FE30A-D47C-362B-4FAF-BC37564CAEDA}"/>
+                <a16:creationId xmlns:a16="http://schemas.microsoft.com/office/drawing/2014/main" id="{B52AE419-5340-C7B9-5ACB-9503B9508DCC}"/>
               </a:ext>
             </a:extLst>
           </p:cNvPr>
@@ -4126,8 +4126,8 @@
         </p:blipFill>
         <p:spPr>
           <a:xfrm>
-            <a:off x="356548" y="299564"/>
-            <a:ext cx="7414903" cy="3596952"/>
+            <a:off x="138218" y="92458"/>
+            <a:ext cx="4884843" cy="5799323"/>
           </a:xfrm>
           <a:prstGeom prst="rect">
             <a:avLst/>
@@ -4139,7 +4139,7 @@
           <p:cNvPr id="7" name="Picture 6">
             <a:extLst>
               <a:ext uri="{FF2B5EF4-FFF2-40B4-BE49-F238E27FC236}">
-                <a16:creationId xmlns:a16="http://schemas.microsoft.com/office/drawing/2014/main" id="{0A44001B-4A21-D5B7-315C-B13BD0FCB658}"/>
+                <a16:creationId xmlns:a16="http://schemas.microsoft.com/office/drawing/2014/main" id="{F50FA099-6C49-5E7B-E3E2-5ECD2EF03D55}"/>
               </a:ext>
             </a:extLst>
           </p:cNvPr>
@@ -4156,8 +4156,68 @@
         </p:blipFill>
         <p:spPr>
           <a:xfrm>
-            <a:off x="7367070" y="4500858"/>
-            <a:ext cx="4610500" cy="2057578"/>
+            <a:off x="138218" y="5891781"/>
+            <a:ext cx="3337849" cy="358171"/>
+          </a:xfrm>
+          <a:prstGeom prst="rect">
+            <a:avLst/>
+          </a:prstGeom>
+        </p:spPr>
+      </p:pic>
+      <p:pic>
+        <p:nvPicPr>
+          <p:cNvPr id="9" name="Picture 8">
+            <a:extLst>
+              <a:ext uri="{FF2B5EF4-FFF2-40B4-BE49-F238E27FC236}">
+                <a16:creationId xmlns:a16="http://schemas.microsoft.com/office/drawing/2014/main" id="{55357F85-EF52-D02F-C2BE-4076C9C0BD45}"/>
+              </a:ext>
+            </a:extLst>
+          </p:cNvPr>
+          <p:cNvPicPr>
+            <a:picLocks noChangeAspect="1"/>
+          </p:cNvPicPr>
+          <p:nvPr/>
+        </p:nvPicPr>
+        <p:blipFill>
+          <a:blip r:embed="rId4"/>
+          <a:stretch>
+            <a:fillRect/>
+          </a:stretch>
+        </p:blipFill>
+        <p:spPr>
+          <a:xfrm>
+            <a:off x="3353298" y="1046480"/>
+            <a:ext cx="8792073" cy="5203472"/>
+          </a:xfrm>
+          <a:prstGeom prst="rect">
+            <a:avLst/>
+          </a:prstGeom>
+        </p:spPr>
+      </p:pic>
+      <p:pic>
+        <p:nvPicPr>
+          <p:cNvPr id="11" name="Picture 10">
+            <a:extLst>
+              <a:ext uri="{FF2B5EF4-FFF2-40B4-BE49-F238E27FC236}">
+                <a16:creationId xmlns:a16="http://schemas.microsoft.com/office/drawing/2014/main" id="{F6A40336-3F4F-842A-411C-A7DEC63ECC0C}"/>
+              </a:ext>
+            </a:extLst>
+          </p:cNvPr>
+          <p:cNvPicPr>
+            <a:picLocks noChangeAspect="1"/>
+          </p:cNvPicPr>
+          <p:nvPr/>
+        </p:nvPicPr>
+        <p:blipFill>
+          <a:blip r:embed="rId5"/>
+          <a:stretch>
+            <a:fillRect/>
+          </a:stretch>
+        </p:blipFill>
+        <p:spPr>
+          <a:xfrm>
+            <a:off x="10031762" y="72138"/>
+            <a:ext cx="2072820" cy="1196444"/>
           </a:xfrm>
           <a:prstGeom prst="rect">
             <a:avLst/>
@@ -4167,7 +4227,7 @@
     </p:spTree>
     <p:extLst>
       <p:ext uri="{BB962C8B-B14F-4D97-AF65-F5344CB8AC3E}">
-        <p14:creationId xmlns:p14="http://schemas.microsoft.com/office/powerpoint/2010/main" val="1669009406"/>
+        <p14:creationId xmlns:p14="http://schemas.microsoft.com/office/powerpoint/2010/main" val="1167288721"/>
       </p:ext>
     </p:extLst>
   </p:cSld>
@@ -4199,7 +4259,7 @@
           <p:cNvPr id="5" name="Picture 4">
             <a:extLst>
               <a:ext uri="{FF2B5EF4-FFF2-40B4-BE49-F238E27FC236}">
-                <a16:creationId xmlns:a16="http://schemas.microsoft.com/office/drawing/2014/main" id="{CB8DF81F-5F76-1CE7-D99A-06E74C9C6025}"/>
+                <a16:creationId xmlns:a16="http://schemas.microsoft.com/office/drawing/2014/main" id="{33CB2892-8C79-DF19-CADC-2FC5C39FDC3D}"/>
               </a:ext>
             </a:extLst>
           </p:cNvPr>
@@ -4216,8 +4276,8 @@
         </p:blipFill>
         <p:spPr>
           <a:xfrm>
-            <a:off x="204146" y="208121"/>
-            <a:ext cx="7475868" cy="3657917"/>
+            <a:off x="150854" y="149666"/>
+            <a:ext cx="6363251" cy="4465707"/>
           </a:xfrm>
           <a:prstGeom prst="rect">
             <a:avLst/>
@@ -4229,7 +4289,7 @@
           <p:cNvPr id="7" name="Picture 6">
             <a:extLst>
               <a:ext uri="{FF2B5EF4-FFF2-40B4-BE49-F238E27FC236}">
-                <a16:creationId xmlns:a16="http://schemas.microsoft.com/office/drawing/2014/main" id="{3D9CC17E-8959-499A-BF26-75E7F72AB86C}"/>
+                <a16:creationId xmlns:a16="http://schemas.microsoft.com/office/drawing/2014/main" id="{D04FDD54-3A56-8727-8F33-191CBC7A0CCB}"/>
               </a:ext>
             </a:extLst>
           </p:cNvPr>
@@ -4246,8 +4306,8 @@
         </p:blipFill>
         <p:spPr>
           <a:xfrm>
-            <a:off x="6096000" y="3667619"/>
-            <a:ext cx="5918500" cy="3063540"/>
+            <a:off x="5629660" y="853441"/>
+            <a:ext cx="6268960" cy="5854894"/>
           </a:xfrm>
           <a:prstGeom prst="rect">
             <a:avLst/>
@@ -4257,7 +4317,7 @@
     </p:spTree>
     <p:extLst>
       <p:ext uri="{BB962C8B-B14F-4D97-AF65-F5344CB8AC3E}">
-        <p14:creationId xmlns:p14="http://schemas.microsoft.com/office/powerpoint/2010/main" val="373864505"/>
+        <p14:creationId xmlns:p14="http://schemas.microsoft.com/office/powerpoint/2010/main" val="2238659982"/>
       </p:ext>
     </p:extLst>
   </p:cSld>
@@ -4289,7 +4349,7 @@
           <p:cNvPr id="5" name="Picture 4">
             <a:extLst>
               <a:ext uri="{FF2B5EF4-FFF2-40B4-BE49-F238E27FC236}">
-                <a16:creationId xmlns:a16="http://schemas.microsoft.com/office/drawing/2014/main" id="{736B5D86-6164-F126-BE31-B135F24CAC03}"/>
+                <a16:creationId xmlns:a16="http://schemas.microsoft.com/office/drawing/2014/main" id="{5B14E4B2-377F-E45C-00E5-C1882BA34BEE}"/>
               </a:ext>
             </a:extLst>
           </p:cNvPr>
@@ -4306,8 +4366,8 @@
         </p:blipFill>
         <p:spPr>
           <a:xfrm>
-            <a:off x="5368129" y="2452202"/>
-            <a:ext cx="3711262" cy="3863675"/>
+            <a:off x="116577" y="114100"/>
+            <a:ext cx="6066046" cy="4618120"/>
           </a:xfrm>
           <a:prstGeom prst="rect">
             <a:avLst/>
@@ -4319,7 +4379,7 @@
           <p:cNvPr id="7" name="Picture 6">
             <a:extLst>
               <a:ext uri="{FF2B5EF4-FFF2-40B4-BE49-F238E27FC236}">
-                <a16:creationId xmlns:a16="http://schemas.microsoft.com/office/drawing/2014/main" id="{91053A37-250F-05A0-A08D-B186F9EFE3B7}"/>
+                <a16:creationId xmlns:a16="http://schemas.microsoft.com/office/drawing/2014/main" id="{692A67FC-9EE1-E286-F296-46D9E306FEAE}"/>
               </a:ext>
             </a:extLst>
           </p:cNvPr>
@@ -4336,68 +4396,8 @@
         </p:blipFill>
         <p:spPr>
           <a:xfrm>
-            <a:off x="9188369" y="646180"/>
-            <a:ext cx="2796782" cy="5768840"/>
-          </a:xfrm>
-          <a:prstGeom prst="rect">
-            <a:avLst/>
-          </a:prstGeom>
-        </p:spPr>
-      </p:pic>
-      <p:pic>
-        <p:nvPicPr>
-          <p:cNvPr id="9" name="Picture 8">
-            <a:extLst>
-              <a:ext uri="{FF2B5EF4-FFF2-40B4-BE49-F238E27FC236}">
-                <a16:creationId xmlns:a16="http://schemas.microsoft.com/office/drawing/2014/main" id="{37E001D5-D56B-0111-1165-E0C5733CADE0}"/>
-              </a:ext>
-            </a:extLst>
-          </p:cNvPr>
-          <p:cNvPicPr>
-            <a:picLocks noChangeAspect="1"/>
-          </p:cNvPicPr>
-          <p:nvPr/>
-        </p:nvPicPr>
-        <p:blipFill>
-          <a:blip r:embed="rId4"/>
-          <a:stretch>
-            <a:fillRect/>
-          </a:stretch>
-        </p:blipFill>
-        <p:spPr>
-          <a:xfrm>
-            <a:off x="206849" y="205465"/>
-            <a:ext cx="5791702" cy="1539373"/>
-          </a:xfrm>
-          <a:prstGeom prst="rect">
-            <a:avLst/>
-          </a:prstGeom>
-        </p:spPr>
-      </p:pic>
-      <p:pic>
-        <p:nvPicPr>
-          <p:cNvPr id="11" name="Picture 10">
-            <a:extLst>
-              <a:ext uri="{FF2B5EF4-FFF2-40B4-BE49-F238E27FC236}">
-                <a16:creationId xmlns:a16="http://schemas.microsoft.com/office/drawing/2014/main" id="{ADAA1DAC-F504-D466-3B6A-948EB1530EE1}"/>
-              </a:ext>
-            </a:extLst>
-          </p:cNvPr>
-          <p:cNvPicPr>
-            <a:picLocks noChangeAspect="1"/>
-          </p:cNvPicPr>
-          <p:nvPr/>
-        </p:nvPicPr>
-        <p:blipFill>
-          <a:blip r:embed="rId5"/>
-          <a:stretch>
-            <a:fillRect/>
-          </a:stretch>
-        </p:blipFill>
-        <p:spPr>
-          <a:xfrm>
-            <a:off x="206849" y="1842557"/>
-            <a:ext cx="3177815" cy="4900085"/>
+            <a:off x="5286754" y="1259840"/>
+            <a:ext cx="6106532" cy="5484060"/>
           </a:xfrm>
           <a:prstGeom prst="rect">
             <a:avLst/>
@@ -4407,7 +4407,7 @@
     </p:spTree>
     <p:extLst>
       <p:ext uri="{BB962C8B-B14F-4D97-AF65-F5344CB8AC3E}">
-        <p14:creationId xmlns:p14="http://schemas.microsoft.com/office/powerpoint/2010/main" val="4128811832"/>
+        <p14:creationId xmlns:p14="http://schemas.microsoft.com/office/powerpoint/2010/main" val="2659243099"/>
       </p:ext>
     </p:extLst>
   </p:cSld>
@@ -4439,7 +4439,7 @@
           <p:cNvPr id="5" name="Picture 4">
             <a:extLst>
               <a:ext uri="{FF2B5EF4-FFF2-40B4-BE49-F238E27FC236}">
-                <a16:creationId xmlns:a16="http://schemas.microsoft.com/office/drawing/2014/main" id="{542DDA4B-66F8-81A3-A212-4F49A2C6A6BA}"/>
+                <a16:creationId xmlns:a16="http://schemas.microsoft.com/office/drawing/2014/main" id="{CC1ECA93-DA8C-3B11-835B-396976280A06}"/>
               </a:ext>
             </a:extLst>
           </p:cNvPr>
@@ -4456,8 +4456,8 @@
         </p:blipFill>
         <p:spPr>
           <a:xfrm>
-            <a:off x="313403" y="531962"/>
-            <a:ext cx="6607113" cy="3863675"/>
+            <a:off x="148304" y="124273"/>
+            <a:ext cx="6591871" cy="4313294"/>
           </a:xfrm>
           <a:prstGeom prst="rect">
             <a:avLst/>
@@ -4469,7 +4469,7 @@
           <p:cNvPr id="7" name="Picture 6">
             <a:extLst>
               <a:ext uri="{FF2B5EF4-FFF2-40B4-BE49-F238E27FC236}">
-                <a16:creationId xmlns:a16="http://schemas.microsoft.com/office/drawing/2014/main" id="{F12797D7-D62B-E897-C165-54EF78A4E3E6}"/>
+                <a16:creationId xmlns:a16="http://schemas.microsoft.com/office/drawing/2014/main" id="{4638AE63-CF44-4A00-059E-45707A3F1C20}"/>
               </a:ext>
             </a:extLst>
           </p:cNvPr>
@@ -4486,38 +4486,8 @@
         </p:blipFill>
         <p:spPr>
           <a:xfrm>
-            <a:off x="6045200" y="5077393"/>
-            <a:ext cx="5921253" cy="1539373"/>
-          </a:xfrm>
-          <a:prstGeom prst="rect">
-            <a:avLst/>
-          </a:prstGeom>
-        </p:spPr>
-      </p:pic>
-      <p:pic>
-        <p:nvPicPr>
-          <p:cNvPr id="9" name="Picture 8">
-            <a:extLst>
-              <a:ext uri="{FF2B5EF4-FFF2-40B4-BE49-F238E27FC236}">
-                <a16:creationId xmlns:a16="http://schemas.microsoft.com/office/drawing/2014/main" id="{0AB4B210-C082-98D1-20F0-5A88808C60FD}"/>
-              </a:ext>
-            </a:extLst>
-          </p:cNvPr>
-          <p:cNvPicPr>
-            <a:picLocks noChangeAspect="1"/>
-          </p:cNvPicPr>
-          <p:nvPr/>
-        </p:nvPicPr>
-        <p:blipFill>
-          <a:blip r:embed="rId4"/>
-          <a:stretch>
-            <a:fillRect/>
-          </a:stretch>
-        </p:blipFill>
-        <p:spPr>
-          <a:xfrm>
-            <a:off x="7247747" y="2736799"/>
-            <a:ext cx="3284505" cy="1181202"/>
+            <a:off x="5237225" y="1351280"/>
+            <a:ext cx="6512930" cy="5382447"/>
           </a:xfrm>
           <a:prstGeom prst="rect">
             <a:avLst/>
@@ -4527,7 +4497,7 @@
     </p:spTree>
     <p:extLst>
       <p:ext uri="{BB962C8B-B14F-4D97-AF65-F5344CB8AC3E}">
-        <p14:creationId xmlns:p14="http://schemas.microsoft.com/office/powerpoint/2010/main" val="3984428687"/>
+        <p14:creationId xmlns:p14="http://schemas.microsoft.com/office/powerpoint/2010/main" val="1694846760"/>
       </p:ext>
     </p:extLst>
   </p:cSld>
@@ -4675,7 +4645,7 @@
           <p:cNvPr id="5" name="Picture 4">
             <a:extLst>
               <a:ext uri="{FF2B5EF4-FFF2-40B4-BE49-F238E27FC236}">
-                <a16:creationId xmlns:a16="http://schemas.microsoft.com/office/drawing/2014/main" id="{06F24B2A-9D5D-BBCC-993E-B39C8E3D255C}"/>
+                <a16:creationId xmlns:a16="http://schemas.microsoft.com/office/drawing/2014/main" id="{DC85A683-6F49-30F9-EBAB-74125933A60D}"/>
               </a:ext>
             </a:extLst>
           </p:cNvPr>
@@ -4692,8 +4662,8 @@
         </p:blipFill>
         <p:spPr>
           <a:xfrm>
-            <a:off x="141991" y="178894"/>
-            <a:ext cx="5730737" cy="4061812"/>
+            <a:off x="83550" y="96356"/>
+            <a:ext cx="6233700" cy="3779848"/>
           </a:xfrm>
           <a:prstGeom prst="rect">
             <a:avLst/>
@@ -4705,7 +4675,7 @@
           <p:cNvPr id="7" name="Picture 6">
             <a:extLst>
               <a:ext uri="{FF2B5EF4-FFF2-40B4-BE49-F238E27FC236}">
-                <a16:creationId xmlns:a16="http://schemas.microsoft.com/office/drawing/2014/main" id="{10AA4DB5-0E4C-7130-A8D9-9975F9B1EC3B}"/>
+                <a16:creationId xmlns:a16="http://schemas.microsoft.com/office/drawing/2014/main" id="{526C4E64-5FAF-D624-3344-98F00DBD1572}"/>
               </a:ext>
             </a:extLst>
           </p:cNvPr>
@@ -4722,38 +4692,8 @@
         </p:blipFill>
         <p:spPr>
           <a:xfrm>
-            <a:off x="5872728" y="5132112"/>
-            <a:ext cx="6111770" cy="1546994"/>
-          </a:xfrm>
-          <a:prstGeom prst="rect">
-            <a:avLst/>
-          </a:prstGeom>
-        </p:spPr>
-      </p:pic>
-      <p:pic>
-        <p:nvPicPr>
-          <p:cNvPr id="9" name="Picture 8">
-            <a:extLst>
-              <a:ext uri="{FF2B5EF4-FFF2-40B4-BE49-F238E27FC236}">
-                <a16:creationId xmlns:a16="http://schemas.microsoft.com/office/drawing/2014/main" id="{CE1DA0AE-BCF8-7628-E102-836ECF7F12F6}"/>
-              </a:ext>
-            </a:extLst>
-          </p:cNvPr>
-          <p:cNvPicPr>
-            <a:picLocks noChangeAspect="1"/>
-          </p:cNvPicPr>
-          <p:nvPr/>
-        </p:nvPicPr>
-        <p:blipFill>
-          <a:blip r:embed="rId4"/>
-          <a:stretch>
-            <a:fillRect/>
-          </a:stretch>
-        </p:blipFill>
-        <p:spPr>
-          <a:xfrm>
-            <a:off x="6096000" y="2374828"/>
-            <a:ext cx="2514818" cy="1661304"/>
+            <a:off x="4472680" y="1337289"/>
+            <a:ext cx="6693160" cy="5424355"/>
           </a:xfrm>
           <a:prstGeom prst="rect">
             <a:avLst/>
@@ -4763,550 +4703,7 @@
     </p:spTree>
     <p:extLst>
       <p:ext uri="{BB962C8B-B14F-4D97-AF65-F5344CB8AC3E}">
-        <p14:creationId xmlns:p14="http://schemas.microsoft.com/office/powerpoint/2010/main" val="2459696689"/>
-      </p:ext>
-    </p:extLst>
-  </p:cSld>
-  <p:clrMapOvr>
-    <a:masterClrMapping/>
-  </p:clrMapOvr>
-</p:sld>
-</file>
-
-<file path=ppt/slides/slide21.xml><?xml version="1.0" encoding="utf-8"?>
-<p:sld xmlns:a="http://schemas.openxmlformats.org/drawingml/2006/main" xmlns:r="http://schemas.openxmlformats.org/officeDocument/2006/relationships" xmlns:p="http://schemas.openxmlformats.org/presentationml/2006/main">
-  <p:cSld>
-    <p:spTree>
-      <p:nvGrpSpPr>
-        <p:cNvPr id="1" name=""/>
-        <p:cNvGrpSpPr/>
-        <p:nvPr/>
-      </p:nvGrpSpPr>
-      <p:grpSpPr>
-        <a:xfrm>
-          <a:off x="0" y="0"/>
-          <a:ext cx="0" cy="0"/>
-          <a:chOff x="0" y="0"/>
-          <a:chExt cx="0" cy="0"/>
-        </a:xfrm>
-      </p:grpSpPr>
-      <p:pic>
-        <p:nvPicPr>
-          <p:cNvPr id="5" name="Picture 4">
-            <a:extLst>
-              <a:ext uri="{FF2B5EF4-FFF2-40B4-BE49-F238E27FC236}">
-                <a16:creationId xmlns:a16="http://schemas.microsoft.com/office/drawing/2014/main" id="{4A10BB6B-AF5D-DCEE-2A59-309C86AD6E29}"/>
-              </a:ext>
-            </a:extLst>
-          </p:cNvPr>
-          <p:cNvPicPr>
-            <a:picLocks noChangeAspect="1"/>
-          </p:cNvPicPr>
-          <p:nvPr/>
-        </p:nvPicPr>
-        <p:blipFill rotWithShape="1">
-          <a:blip r:embed="rId2"/>
-          <a:srcRect r="36421"/>
-          <a:stretch/>
-        </p:blipFill>
-        <p:spPr>
-          <a:xfrm>
-            <a:off x="218191" y="252553"/>
-            <a:ext cx="3662930" cy="4077053"/>
-          </a:xfrm>
-          <a:prstGeom prst="rect">
-            <a:avLst/>
-          </a:prstGeom>
-        </p:spPr>
-      </p:pic>
-      <p:pic>
-        <p:nvPicPr>
-          <p:cNvPr id="7" name="Picture 6">
-            <a:extLst>
-              <a:ext uri="{FF2B5EF4-FFF2-40B4-BE49-F238E27FC236}">
-                <a16:creationId xmlns:a16="http://schemas.microsoft.com/office/drawing/2014/main" id="{54F00FAF-9378-9AA6-D9D6-9B721EF48A03}"/>
-              </a:ext>
-            </a:extLst>
-          </p:cNvPr>
-          <p:cNvPicPr>
-            <a:picLocks noChangeAspect="1"/>
-          </p:cNvPicPr>
-          <p:nvPr/>
-        </p:nvPicPr>
-        <p:blipFill>
-          <a:blip r:embed="rId3"/>
-          <a:stretch>
-            <a:fillRect/>
-          </a:stretch>
-        </p:blipFill>
-        <p:spPr>
-          <a:xfrm>
-            <a:off x="6096000" y="557063"/>
-            <a:ext cx="2118544" cy="502964"/>
-          </a:xfrm>
-          <a:prstGeom prst="rect">
-            <a:avLst/>
-          </a:prstGeom>
-        </p:spPr>
-      </p:pic>
-      <p:pic>
-        <p:nvPicPr>
-          <p:cNvPr id="9" name="Picture 8">
-            <a:extLst>
-              <a:ext uri="{FF2B5EF4-FFF2-40B4-BE49-F238E27FC236}">
-                <a16:creationId xmlns:a16="http://schemas.microsoft.com/office/drawing/2014/main" id="{83C5CE83-5522-10FF-3F9B-A50FEA9AA816}"/>
-              </a:ext>
-            </a:extLst>
-          </p:cNvPr>
-          <p:cNvPicPr>
-            <a:picLocks noChangeAspect="1"/>
-          </p:cNvPicPr>
-          <p:nvPr/>
-        </p:nvPicPr>
-        <p:blipFill>
-          <a:blip r:embed="rId4"/>
-          <a:stretch>
-            <a:fillRect/>
-          </a:stretch>
-        </p:blipFill>
-        <p:spPr>
-          <a:xfrm>
-            <a:off x="5557214" y="2368341"/>
-            <a:ext cx="6416596" cy="4320914"/>
-          </a:xfrm>
-          <a:prstGeom prst="rect">
-            <a:avLst/>
-          </a:prstGeom>
-        </p:spPr>
-      </p:pic>
-      <p:pic>
-        <p:nvPicPr>
-          <p:cNvPr id="10" name="Picture 9">
-            <a:extLst>
-              <a:ext uri="{FF2B5EF4-FFF2-40B4-BE49-F238E27FC236}">
-                <a16:creationId xmlns:a16="http://schemas.microsoft.com/office/drawing/2014/main" id="{162E7367-B9C9-A56F-673B-107CF964EA78}"/>
-              </a:ext>
-            </a:extLst>
-          </p:cNvPr>
-          <p:cNvPicPr>
-            <a:picLocks noChangeAspect="1"/>
-          </p:cNvPicPr>
-          <p:nvPr/>
-        </p:nvPicPr>
-        <p:blipFill rotWithShape="1">
-          <a:blip r:embed="rId2"/>
-          <a:srcRect l="64637" t="48157"/>
-          <a:stretch/>
-        </p:blipFill>
-        <p:spPr>
-          <a:xfrm>
-            <a:off x="3881121" y="254676"/>
-            <a:ext cx="2037329" cy="2113665"/>
-          </a:xfrm>
-          <a:prstGeom prst="rect">
-            <a:avLst/>
-          </a:prstGeom>
-        </p:spPr>
-      </p:pic>
-    </p:spTree>
-    <p:extLst>
-      <p:ext uri="{BB962C8B-B14F-4D97-AF65-F5344CB8AC3E}">
-        <p14:creationId xmlns:p14="http://schemas.microsoft.com/office/powerpoint/2010/main" val="2337070100"/>
-      </p:ext>
-    </p:extLst>
-  </p:cSld>
-  <p:clrMapOvr>
-    <a:masterClrMapping/>
-  </p:clrMapOvr>
-</p:sld>
-</file>
-
-<file path=ppt/slides/slide22.xml><?xml version="1.0" encoding="utf-8"?>
-<p:sld xmlns:a="http://schemas.openxmlformats.org/drawingml/2006/main" xmlns:r="http://schemas.openxmlformats.org/officeDocument/2006/relationships" xmlns:p="http://schemas.openxmlformats.org/presentationml/2006/main">
-  <p:cSld>
-    <p:spTree>
-      <p:nvGrpSpPr>
-        <p:cNvPr id="1" name=""/>
-        <p:cNvGrpSpPr/>
-        <p:nvPr/>
-      </p:nvGrpSpPr>
-      <p:grpSpPr>
-        <a:xfrm>
-          <a:off x="0" y="0"/>
-          <a:ext cx="0" cy="0"/>
-          <a:chOff x="0" y="0"/>
-          <a:chExt cx="0" cy="0"/>
-        </a:xfrm>
-      </p:grpSpPr>
-      <p:pic>
-        <p:nvPicPr>
-          <p:cNvPr id="5" name="Picture 4">
-            <a:extLst>
-              <a:ext uri="{FF2B5EF4-FFF2-40B4-BE49-F238E27FC236}">
-                <a16:creationId xmlns:a16="http://schemas.microsoft.com/office/drawing/2014/main" id="{A2668988-FA4B-EB54-1333-186290E91384}"/>
-              </a:ext>
-            </a:extLst>
-          </p:cNvPr>
-          <p:cNvPicPr>
-            <a:picLocks noChangeAspect="1"/>
-          </p:cNvPicPr>
-          <p:nvPr/>
-        </p:nvPicPr>
-        <p:blipFill>
-          <a:blip r:embed="rId2"/>
-          <a:stretch>
-            <a:fillRect/>
-          </a:stretch>
-        </p:blipFill>
-        <p:spPr>
-          <a:xfrm>
-            <a:off x="404725" y="342661"/>
-            <a:ext cx="9350550" cy="5502117"/>
-          </a:xfrm>
-          <a:prstGeom prst="rect">
-            <a:avLst/>
-          </a:prstGeom>
-        </p:spPr>
-      </p:pic>
-      <p:pic>
-        <p:nvPicPr>
-          <p:cNvPr id="9" name="Picture 8">
-            <a:extLst>
-              <a:ext uri="{FF2B5EF4-FFF2-40B4-BE49-F238E27FC236}">
-                <a16:creationId xmlns:a16="http://schemas.microsoft.com/office/drawing/2014/main" id="{8941E01C-FE98-0753-7529-2DEEB606AFD3}"/>
-              </a:ext>
-            </a:extLst>
-          </p:cNvPr>
-          <p:cNvPicPr>
-            <a:picLocks noChangeAspect="1"/>
-          </p:cNvPicPr>
-          <p:nvPr/>
-        </p:nvPicPr>
-        <p:blipFill>
-          <a:blip r:embed="rId3"/>
-          <a:stretch>
-            <a:fillRect/>
-          </a:stretch>
-        </p:blipFill>
-        <p:spPr>
-          <a:xfrm>
-            <a:off x="9607766" y="5486550"/>
-            <a:ext cx="2179509" cy="1028789"/>
-          </a:xfrm>
-          <a:prstGeom prst="rect">
-            <a:avLst/>
-          </a:prstGeom>
-        </p:spPr>
-      </p:pic>
-    </p:spTree>
-    <p:extLst>
-      <p:ext uri="{BB962C8B-B14F-4D97-AF65-F5344CB8AC3E}">
-        <p14:creationId xmlns:p14="http://schemas.microsoft.com/office/powerpoint/2010/main" val="2591160841"/>
-      </p:ext>
-    </p:extLst>
-  </p:cSld>
-  <p:clrMapOvr>
-    <a:masterClrMapping/>
-  </p:clrMapOvr>
-</p:sld>
-</file>
-
-<file path=ppt/slides/slide23.xml><?xml version="1.0" encoding="utf-8"?>
-<p:sld xmlns:a="http://schemas.openxmlformats.org/drawingml/2006/main" xmlns:r="http://schemas.openxmlformats.org/officeDocument/2006/relationships" xmlns:p="http://schemas.openxmlformats.org/presentationml/2006/main">
-  <p:cSld>
-    <p:spTree>
-      <p:nvGrpSpPr>
-        <p:cNvPr id="1" name=""/>
-        <p:cNvGrpSpPr/>
-        <p:nvPr/>
-      </p:nvGrpSpPr>
-      <p:grpSpPr>
-        <a:xfrm>
-          <a:off x="0" y="0"/>
-          <a:ext cx="0" cy="0"/>
-          <a:chOff x="0" y="0"/>
-          <a:chExt cx="0" cy="0"/>
-        </a:xfrm>
-      </p:grpSpPr>
-      <p:pic>
-        <p:nvPicPr>
-          <p:cNvPr id="5" name="Picture 4">
-            <a:extLst>
-              <a:ext uri="{FF2B5EF4-FFF2-40B4-BE49-F238E27FC236}">
-                <a16:creationId xmlns:a16="http://schemas.microsoft.com/office/drawing/2014/main" id="{B724CC2F-9B5F-9AE4-3AF5-C6D8ABCE501D}"/>
-              </a:ext>
-            </a:extLst>
-          </p:cNvPr>
-          <p:cNvPicPr>
-            <a:picLocks noChangeAspect="1"/>
-          </p:cNvPicPr>
-          <p:nvPr/>
-        </p:nvPicPr>
-        <p:blipFill>
-          <a:blip r:embed="rId2"/>
-          <a:stretch>
-            <a:fillRect/>
-          </a:stretch>
-        </p:blipFill>
-        <p:spPr>
-          <a:xfrm>
-            <a:off x="3473227" y="144691"/>
-            <a:ext cx="5143946" cy="2057578"/>
-          </a:xfrm>
-          <a:prstGeom prst="rect">
-            <a:avLst/>
-          </a:prstGeom>
-        </p:spPr>
-      </p:pic>
-      <p:pic>
-        <p:nvPicPr>
-          <p:cNvPr id="7" name="Picture 6">
-            <a:extLst>
-              <a:ext uri="{FF2B5EF4-FFF2-40B4-BE49-F238E27FC236}">
-                <a16:creationId xmlns:a16="http://schemas.microsoft.com/office/drawing/2014/main" id="{B97AE214-03C6-7F4F-8878-FA6D1BAC3F4D}"/>
-              </a:ext>
-            </a:extLst>
-          </p:cNvPr>
-          <p:cNvPicPr>
-            <a:picLocks noChangeAspect="1"/>
-          </p:cNvPicPr>
-          <p:nvPr/>
-        </p:nvPicPr>
-        <p:blipFill>
-          <a:blip r:embed="rId3"/>
-          <a:stretch>
-            <a:fillRect/>
-          </a:stretch>
-        </p:blipFill>
-        <p:spPr>
-          <a:xfrm>
-            <a:off x="3473227" y="2202269"/>
-            <a:ext cx="3557493" cy="4527718"/>
-          </a:xfrm>
-          <a:prstGeom prst="rect">
-            <a:avLst/>
-          </a:prstGeom>
-        </p:spPr>
-      </p:pic>
-    </p:spTree>
-    <p:extLst>
-      <p:ext uri="{BB962C8B-B14F-4D97-AF65-F5344CB8AC3E}">
-        <p14:creationId xmlns:p14="http://schemas.microsoft.com/office/powerpoint/2010/main" val="3587802586"/>
-      </p:ext>
-    </p:extLst>
-  </p:cSld>
-  <p:clrMapOvr>
-    <a:masterClrMapping/>
-  </p:clrMapOvr>
-</p:sld>
-</file>
-
-<file path=ppt/slides/slide24.xml><?xml version="1.0" encoding="utf-8"?>
-<p:sld xmlns:a="http://schemas.openxmlformats.org/drawingml/2006/main" xmlns:r="http://schemas.openxmlformats.org/officeDocument/2006/relationships" xmlns:p="http://schemas.openxmlformats.org/presentationml/2006/main">
-  <p:cSld>
-    <p:spTree>
-      <p:nvGrpSpPr>
-        <p:cNvPr id="1" name=""/>
-        <p:cNvGrpSpPr/>
-        <p:nvPr/>
-      </p:nvGrpSpPr>
-      <p:grpSpPr>
-        <a:xfrm>
-          <a:off x="0" y="0"/>
-          <a:ext cx="0" cy="0"/>
-          <a:chOff x="0" y="0"/>
-          <a:chExt cx="0" cy="0"/>
-        </a:xfrm>
-      </p:grpSpPr>
-      <p:pic>
-        <p:nvPicPr>
-          <p:cNvPr id="5" name="Picture 4">
-            <a:extLst>
-              <a:ext uri="{FF2B5EF4-FFF2-40B4-BE49-F238E27FC236}">
-                <a16:creationId xmlns:a16="http://schemas.microsoft.com/office/drawing/2014/main" id="{31FE2AD9-4A7C-6C9D-C08E-9FFC9EB79471}"/>
-              </a:ext>
-            </a:extLst>
-          </p:cNvPr>
-          <p:cNvPicPr>
-            <a:picLocks noChangeAspect="1"/>
-          </p:cNvPicPr>
-          <p:nvPr/>
-        </p:nvPicPr>
-        <p:blipFill>
-          <a:blip r:embed="rId2"/>
-          <a:stretch>
-            <a:fillRect/>
-          </a:stretch>
-        </p:blipFill>
-        <p:spPr>
-          <a:xfrm>
-            <a:off x="224553" y="241125"/>
-            <a:ext cx="5464013" cy="4038950"/>
-          </a:xfrm>
-          <a:prstGeom prst="rect">
-            <a:avLst/>
-          </a:prstGeom>
-        </p:spPr>
-      </p:pic>
-      <p:pic>
-        <p:nvPicPr>
-          <p:cNvPr id="7" name="Picture 6">
-            <a:extLst>
-              <a:ext uri="{FF2B5EF4-FFF2-40B4-BE49-F238E27FC236}">
-                <a16:creationId xmlns:a16="http://schemas.microsoft.com/office/drawing/2014/main" id="{D4F50CA8-D311-1A98-DDA1-DE0DAAAE8BA0}"/>
-              </a:ext>
-            </a:extLst>
-          </p:cNvPr>
-          <p:cNvPicPr>
-            <a:picLocks noChangeAspect="1"/>
-          </p:cNvPicPr>
-          <p:nvPr/>
-        </p:nvPicPr>
-        <p:blipFill>
-          <a:blip r:embed="rId3"/>
-          <a:stretch>
-            <a:fillRect/>
-          </a:stretch>
-        </p:blipFill>
-        <p:spPr>
-          <a:xfrm>
-            <a:off x="3988985" y="1559499"/>
-            <a:ext cx="1958510" cy="701101"/>
-          </a:xfrm>
-          <a:prstGeom prst="rect">
-            <a:avLst/>
-          </a:prstGeom>
-        </p:spPr>
-      </p:pic>
-      <p:pic>
-        <p:nvPicPr>
-          <p:cNvPr id="9" name="Picture 8">
-            <a:extLst>
-              <a:ext uri="{FF2B5EF4-FFF2-40B4-BE49-F238E27FC236}">
-                <a16:creationId xmlns:a16="http://schemas.microsoft.com/office/drawing/2014/main" id="{E11A7E59-7FD4-379E-6FA8-CB742896C468}"/>
-              </a:ext>
-            </a:extLst>
-          </p:cNvPr>
-          <p:cNvPicPr>
-            <a:picLocks noChangeAspect="1"/>
-          </p:cNvPicPr>
-          <p:nvPr/>
-        </p:nvPicPr>
-        <p:blipFill>
-          <a:blip r:embed="rId4"/>
-          <a:stretch>
-            <a:fillRect/>
-          </a:stretch>
-        </p:blipFill>
-        <p:spPr>
-          <a:xfrm>
-            <a:off x="6337942" y="1788160"/>
-            <a:ext cx="5629505" cy="4830049"/>
-          </a:xfrm>
-          <a:prstGeom prst="rect">
-            <a:avLst/>
-          </a:prstGeom>
-        </p:spPr>
-      </p:pic>
-    </p:spTree>
-    <p:extLst>
-      <p:ext uri="{BB962C8B-B14F-4D97-AF65-F5344CB8AC3E}">
-        <p14:creationId xmlns:p14="http://schemas.microsoft.com/office/powerpoint/2010/main" val="3242229852"/>
-      </p:ext>
-    </p:extLst>
-  </p:cSld>
-  <p:clrMapOvr>
-    <a:masterClrMapping/>
-  </p:clrMapOvr>
-</p:sld>
-</file>
-
-<file path=ppt/slides/slide25.xml><?xml version="1.0" encoding="utf-8"?>
-<p:sld xmlns:a="http://schemas.openxmlformats.org/drawingml/2006/main" xmlns:r="http://schemas.openxmlformats.org/officeDocument/2006/relationships" xmlns:p="http://schemas.openxmlformats.org/presentationml/2006/main">
-  <p:cSld>
-    <p:spTree>
-      <p:nvGrpSpPr>
-        <p:cNvPr id="1" name=""/>
-        <p:cNvGrpSpPr/>
-        <p:nvPr/>
-      </p:nvGrpSpPr>
-      <p:grpSpPr>
-        <a:xfrm>
-          <a:off x="0" y="0"/>
-          <a:ext cx="0" cy="0"/>
-          <a:chOff x="0" y="0"/>
-          <a:chExt cx="0" cy="0"/>
-        </a:xfrm>
-      </p:grpSpPr>
-      <p:pic>
-        <p:nvPicPr>
-          <p:cNvPr id="5" name="Picture 4" descr="A graph with a red line&#10;&#10;Description automatically generated">
-            <a:extLst>
-              <a:ext uri="{FF2B5EF4-FFF2-40B4-BE49-F238E27FC236}">
-                <a16:creationId xmlns:a16="http://schemas.microsoft.com/office/drawing/2014/main" id="{A67AEAE3-C1B0-52F2-81DC-8C63B5AE9C04}"/>
-              </a:ext>
-            </a:extLst>
-          </p:cNvPr>
-          <p:cNvPicPr>
-            <a:picLocks noChangeAspect="1"/>
-          </p:cNvPicPr>
-          <p:nvPr/>
-        </p:nvPicPr>
-        <p:blipFill rotWithShape="1">
-          <a:blip r:embed="rId2">
-            <a:extLst>
-              <a:ext uri="{28A0092B-C50C-407E-A947-70E740481C1C}">
-                <a14:useLocalDpi xmlns:a14="http://schemas.microsoft.com/office/drawing/2010/main" val="0"/>
-              </a:ext>
-            </a:extLst>
-          </a:blip>
-          <a:srcRect t="9750" r="16000"/>
-          <a:stretch/>
-        </p:blipFill>
-        <p:spPr>
-          <a:xfrm>
-            <a:off x="171566" y="246380"/>
-            <a:ext cx="11848868" cy="6365240"/>
-          </a:xfrm>
-          <a:prstGeom prst="rect">
-            <a:avLst/>
-          </a:prstGeom>
-        </p:spPr>
-      </p:pic>
-    </p:spTree>
-    <p:extLst>
-      <p:ext uri="{BB962C8B-B14F-4D97-AF65-F5344CB8AC3E}">
-        <p14:creationId xmlns:p14="http://schemas.microsoft.com/office/powerpoint/2010/main" val="3099345314"/>
-      </p:ext>
-    </p:extLst>
-  </p:cSld>
-  <p:clrMapOvr>
-    <a:masterClrMapping/>
-  </p:clrMapOvr>
-</p:sld>
-</file>
-
-<file path=ppt/slides/slide26.xml><?xml version="1.0" encoding="utf-8"?>
-<p:sld xmlns:a="http://schemas.openxmlformats.org/drawingml/2006/main" xmlns:r="http://schemas.openxmlformats.org/officeDocument/2006/relationships" xmlns:p="http://schemas.openxmlformats.org/presentationml/2006/main">
-  <p:cSld>
-    <p:spTree>
-      <p:nvGrpSpPr>
-        <p:cNvPr id="1" name=""/>
-        <p:cNvGrpSpPr/>
-        <p:nvPr/>
-      </p:nvGrpSpPr>
-      <p:grpSpPr>
-        <a:xfrm>
-          <a:off x="0" y="0"/>
-          <a:ext cx="0" cy="0"/>
-          <a:chOff x="0" y="0"/>
-          <a:chExt cx="0" cy="0"/>
-        </a:xfrm>
-      </p:grpSpPr>
-    </p:spTree>
-    <p:extLst>
-      <p:ext uri="{BB962C8B-B14F-4D97-AF65-F5344CB8AC3E}">
-        <p14:creationId xmlns:p14="http://schemas.microsoft.com/office/powerpoint/2010/main" val="628859178"/>
+        <p14:creationId xmlns:p14="http://schemas.microsoft.com/office/powerpoint/2010/main" val="2132193655"/>
       </p:ext>
     </p:extLst>
   </p:cSld>
@@ -5464,40 +4861,12 @@
           <a:chExt cx="0" cy="0"/>
         </a:xfrm>
       </p:grpSpPr>
-      <p:sp>
-        <p:nvSpPr>
-          <p:cNvPr id="2" name="Title 1">
-            <a:extLst>
-              <a:ext uri="{FF2B5EF4-FFF2-40B4-BE49-F238E27FC236}">
-                <a16:creationId xmlns:a16="http://schemas.microsoft.com/office/drawing/2014/main" id="{717114C5-A6FF-4070-A155-C5B2EB3967C5}"/>
-              </a:ext>
-            </a:extLst>
-          </p:cNvPr>
-          <p:cNvSpPr>
-            <a:spLocks noGrp="1"/>
-          </p:cNvSpPr>
-          <p:nvPr>
-            <p:ph type="title"/>
-          </p:nvPr>
-        </p:nvSpPr>
-        <p:spPr/>
-        <p:txBody>
-          <a:bodyPr/>
-          <a:lstStyle/>
-          <a:p>
-            <a:r>
-              <a:rPr lang="en-PH" dirty="0"/>
-              <a:t>Data pre-processing</a:t>
-            </a:r>
-          </a:p>
-        </p:txBody>
-      </p:sp>
       <p:pic>
         <p:nvPicPr>
           <p:cNvPr id="5" name="Picture 4">
             <a:extLst>
               <a:ext uri="{FF2B5EF4-FFF2-40B4-BE49-F238E27FC236}">
-                <a16:creationId xmlns:a16="http://schemas.microsoft.com/office/drawing/2014/main" id="{1DDA1C04-1E71-B595-8735-ADA786FEDE27}"/>
+                <a16:creationId xmlns:a16="http://schemas.microsoft.com/office/drawing/2014/main" id="{4827E847-FA8E-E240-A941-4079720CDF54}"/>
               </a:ext>
             </a:extLst>
           </p:cNvPr>
@@ -5514,38 +4883,8 @@
         </p:blipFill>
         <p:spPr>
           <a:xfrm>
-            <a:off x="344026" y="1690688"/>
-            <a:ext cx="11009774" cy="3016287"/>
-          </a:xfrm>
-          <a:prstGeom prst="rect">
-            <a:avLst/>
-          </a:prstGeom>
-        </p:spPr>
-      </p:pic>
-      <p:pic>
-        <p:nvPicPr>
-          <p:cNvPr id="7" name="Picture 6">
-            <a:extLst>
-              <a:ext uri="{FF2B5EF4-FFF2-40B4-BE49-F238E27FC236}">
-                <a16:creationId xmlns:a16="http://schemas.microsoft.com/office/drawing/2014/main" id="{81A57340-D5DD-13B7-2AB1-72873FA2C7CF}"/>
-              </a:ext>
-            </a:extLst>
-          </p:cNvPr>
-          <p:cNvPicPr>
-            <a:picLocks noChangeAspect="1"/>
-          </p:cNvPicPr>
-          <p:nvPr/>
-        </p:nvPicPr>
-        <p:blipFill>
-          <a:blip r:embed="rId3"/>
-          <a:stretch>
-            <a:fillRect/>
-          </a:stretch>
-        </p:blipFill>
-        <p:spPr>
-          <a:xfrm>
-            <a:off x="4653042" y="3536059"/>
-            <a:ext cx="5486875" cy="2956816"/>
+            <a:off x="386080" y="1369199"/>
+            <a:ext cx="11419840" cy="3415846"/>
           </a:xfrm>
           <a:prstGeom prst="rect">
             <a:avLst/>
@@ -5555,7 +4894,7 @@
     </p:spTree>
     <p:extLst>
       <p:ext uri="{BB962C8B-B14F-4D97-AF65-F5344CB8AC3E}">
-        <p14:creationId xmlns:p14="http://schemas.microsoft.com/office/powerpoint/2010/main" val="569272409"/>
+        <p14:creationId xmlns:p14="http://schemas.microsoft.com/office/powerpoint/2010/main" val="1156375499"/>
       </p:ext>
     </p:extLst>
   </p:cSld>
@@ -5582,40 +4921,12 @@
           <a:chExt cx="0" cy="0"/>
         </a:xfrm>
       </p:grpSpPr>
-      <p:sp>
-        <p:nvSpPr>
-          <p:cNvPr id="2" name="Title 1">
-            <a:extLst>
-              <a:ext uri="{FF2B5EF4-FFF2-40B4-BE49-F238E27FC236}">
-                <a16:creationId xmlns:a16="http://schemas.microsoft.com/office/drawing/2014/main" id="{717114C5-A6FF-4070-A155-C5B2EB3967C5}"/>
-              </a:ext>
-            </a:extLst>
-          </p:cNvPr>
-          <p:cNvSpPr>
-            <a:spLocks noGrp="1"/>
-          </p:cNvSpPr>
-          <p:nvPr>
-            <p:ph type="title"/>
-          </p:nvPr>
-        </p:nvSpPr>
-        <p:spPr/>
-        <p:txBody>
-          <a:bodyPr/>
-          <a:lstStyle/>
-          <a:p>
-            <a:r>
-              <a:rPr lang="en-PH" dirty="0"/>
-              <a:t>Data pre-processing</a:t>
-            </a:r>
-          </a:p>
-        </p:txBody>
-      </p:sp>
       <p:pic>
         <p:nvPicPr>
-          <p:cNvPr id="4" name="Picture 3">
-            <a:extLst>
-              <a:ext uri="{FF2B5EF4-FFF2-40B4-BE49-F238E27FC236}">
-                <a16:creationId xmlns:a16="http://schemas.microsoft.com/office/drawing/2014/main" id="{06B59DDE-28CC-BDBB-4D96-F1BC16EC4BAA}"/>
+          <p:cNvPr id="5" name="Picture 4">
+            <a:extLst>
+              <a:ext uri="{FF2B5EF4-FFF2-40B4-BE49-F238E27FC236}">
+                <a16:creationId xmlns:a16="http://schemas.microsoft.com/office/drawing/2014/main" id="{879C4C49-104C-0EBB-2B4B-7A229C051504}"/>
               </a:ext>
             </a:extLst>
           </p:cNvPr>
@@ -5632,8 +4943,68 @@
         </p:blipFill>
         <p:spPr>
           <a:xfrm>
-            <a:off x="479573" y="1645765"/>
-            <a:ext cx="5616427" cy="3566469"/>
+            <a:off x="788519" y="653851"/>
+            <a:ext cx="3482642" cy="4595258"/>
+          </a:xfrm>
+          <a:prstGeom prst="rect">
+            <a:avLst/>
+          </a:prstGeom>
+        </p:spPr>
+      </p:pic>
+      <p:pic>
+        <p:nvPicPr>
+          <p:cNvPr id="7" name="Picture 6">
+            <a:extLst>
+              <a:ext uri="{FF2B5EF4-FFF2-40B4-BE49-F238E27FC236}">
+                <a16:creationId xmlns:a16="http://schemas.microsoft.com/office/drawing/2014/main" id="{AF55BE3A-EEA2-9A57-9E34-60F2815B6263}"/>
+              </a:ext>
+            </a:extLst>
+          </p:cNvPr>
+          <p:cNvPicPr>
+            <a:picLocks noChangeAspect="1"/>
+          </p:cNvPicPr>
+          <p:nvPr/>
+        </p:nvPicPr>
+        <p:blipFill>
+          <a:blip r:embed="rId3"/>
+          <a:stretch>
+            <a:fillRect/>
+          </a:stretch>
+        </p:blipFill>
+        <p:spPr>
+          <a:xfrm>
+            <a:off x="4475336" y="653851"/>
+            <a:ext cx="3322608" cy="4861981"/>
+          </a:xfrm>
+          <a:prstGeom prst="rect">
+            <a:avLst/>
+          </a:prstGeom>
+        </p:spPr>
+      </p:pic>
+      <p:pic>
+        <p:nvPicPr>
+          <p:cNvPr id="9" name="Picture 8">
+            <a:extLst>
+              <a:ext uri="{FF2B5EF4-FFF2-40B4-BE49-F238E27FC236}">
+                <a16:creationId xmlns:a16="http://schemas.microsoft.com/office/drawing/2014/main" id="{188F60F3-9A5D-4BB2-39D0-4D3E07F9F0E5}"/>
+              </a:ext>
+            </a:extLst>
+          </p:cNvPr>
+          <p:cNvPicPr>
+            <a:picLocks noChangeAspect="1"/>
+          </p:cNvPicPr>
+          <p:nvPr/>
+        </p:nvPicPr>
+        <p:blipFill>
+          <a:blip r:embed="rId4"/>
+          <a:stretch>
+            <a:fillRect/>
+          </a:stretch>
+        </p:blipFill>
+        <p:spPr>
+          <a:xfrm>
+            <a:off x="8002119" y="658931"/>
+            <a:ext cx="3215919" cy="1310754"/>
           </a:xfrm>
           <a:prstGeom prst="rect">
             <a:avLst/>
@@ -5643,7 +5014,7 @@
     </p:spTree>
     <p:extLst>
       <p:ext uri="{BB962C8B-B14F-4D97-AF65-F5344CB8AC3E}">
-        <p14:creationId xmlns:p14="http://schemas.microsoft.com/office/powerpoint/2010/main" val="1812976138"/>
+        <p14:creationId xmlns:p14="http://schemas.microsoft.com/office/powerpoint/2010/main" val="1545216937"/>
       </p:ext>
     </p:extLst>
   </p:cSld>
@@ -5670,40 +5041,12 @@
           <a:chExt cx="0" cy="0"/>
         </a:xfrm>
       </p:grpSpPr>
-      <p:sp>
-        <p:nvSpPr>
-          <p:cNvPr id="2" name="Title 1">
-            <a:extLst>
-              <a:ext uri="{FF2B5EF4-FFF2-40B4-BE49-F238E27FC236}">
-                <a16:creationId xmlns:a16="http://schemas.microsoft.com/office/drawing/2014/main" id="{717114C5-A6FF-4070-A155-C5B2EB3967C5}"/>
-              </a:ext>
-            </a:extLst>
-          </p:cNvPr>
-          <p:cNvSpPr>
-            <a:spLocks noGrp="1"/>
-          </p:cNvSpPr>
-          <p:nvPr>
-            <p:ph type="title"/>
-          </p:nvPr>
-        </p:nvSpPr>
-        <p:spPr/>
-        <p:txBody>
-          <a:bodyPr/>
-          <a:lstStyle/>
-          <a:p>
-            <a:r>
-              <a:rPr lang="en-PH" dirty="0"/>
-              <a:t>Data pre-processing</a:t>
-            </a:r>
-          </a:p>
-        </p:txBody>
-      </p:sp>
       <p:pic>
         <p:nvPicPr>
           <p:cNvPr id="5" name="Picture 4">
             <a:extLst>
               <a:ext uri="{FF2B5EF4-FFF2-40B4-BE49-F238E27FC236}">
-                <a16:creationId xmlns:a16="http://schemas.microsoft.com/office/drawing/2014/main" id="{99DC1401-F8FB-6C54-3838-61F602FCFABD}"/>
+                <a16:creationId xmlns:a16="http://schemas.microsoft.com/office/drawing/2014/main" id="{BDAB3984-C2AB-9C3E-2881-CF54D897B2AE}"/>
               </a:ext>
             </a:extLst>
           </p:cNvPr>
@@ -5720,8 +5063,8 @@
         </p:blipFill>
         <p:spPr>
           <a:xfrm>
-            <a:off x="838200" y="1554687"/>
-            <a:ext cx="8436071" cy="4938188"/>
+            <a:off x="1068501" y="1512472"/>
+            <a:ext cx="10054998" cy="4024728"/>
           </a:xfrm>
           <a:prstGeom prst="rect">
             <a:avLst/>
@@ -5731,7 +5074,7 @@
     </p:spTree>
     <p:extLst>
       <p:ext uri="{BB962C8B-B14F-4D97-AF65-F5344CB8AC3E}">
-        <p14:creationId xmlns:p14="http://schemas.microsoft.com/office/powerpoint/2010/main" val="2484828892"/>
+        <p14:creationId xmlns:p14="http://schemas.microsoft.com/office/powerpoint/2010/main" val="1605547780"/>
       </p:ext>
     </p:extLst>
   </p:cSld>
@@ -5758,40 +5101,12 @@
           <a:chExt cx="0" cy="0"/>
         </a:xfrm>
       </p:grpSpPr>
-      <p:sp>
-        <p:nvSpPr>
-          <p:cNvPr id="2" name="Title 1">
-            <a:extLst>
-              <a:ext uri="{FF2B5EF4-FFF2-40B4-BE49-F238E27FC236}">
-                <a16:creationId xmlns:a16="http://schemas.microsoft.com/office/drawing/2014/main" id="{717114C5-A6FF-4070-A155-C5B2EB3967C5}"/>
-              </a:ext>
-            </a:extLst>
-          </p:cNvPr>
-          <p:cNvSpPr>
-            <a:spLocks noGrp="1"/>
-          </p:cNvSpPr>
-          <p:nvPr>
-            <p:ph type="title"/>
-          </p:nvPr>
-        </p:nvSpPr>
-        <p:spPr/>
-        <p:txBody>
-          <a:bodyPr/>
-          <a:lstStyle/>
-          <a:p>
-            <a:r>
-              <a:rPr lang="en-PH" dirty="0"/>
-              <a:t>Data pre-processing</a:t>
-            </a:r>
-          </a:p>
-        </p:txBody>
-      </p:sp>
       <p:pic>
         <p:nvPicPr>
-          <p:cNvPr id="4" name="Picture 3">
-            <a:extLst>
-              <a:ext uri="{FF2B5EF4-FFF2-40B4-BE49-F238E27FC236}">
-                <a16:creationId xmlns:a16="http://schemas.microsoft.com/office/drawing/2014/main" id="{611AC674-FC61-5CAE-2B9F-E6143D76E2DA}"/>
+          <p:cNvPr id="5" name="Picture 4">
+            <a:extLst>
+              <a:ext uri="{FF2B5EF4-FFF2-40B4-BE49-F238E27FC236}">
+                <a16:creationId xmlns:a16="http://schemas.microsoft.com/office/drawing/2014/main" id="{876602DD-CAD8-2152-8F00-3958CD820827}"/>
               </a:ext>
             </a:extLst>
           </p:cNvPr>
@@ -5800,15 +5115,46 @@
           </p:cNvPicPr>
           <p:nvPr/>
         </p:nvPicPr>
-        <p:blipFill rotWithShape="1">
+        <p:blipFill>
           <a:blip r:embed="rId2"/>
-          <a:srcRect l="1079"/>
-          <a:stretch/>
+          <a:stretch>
+            <a:fillRect/>
+          </a:stretch>
         </p:blipFill>
         <p:spPr>
           <a:xfrm>
-            <a:off x="1036320" y="1578514"/>
-            <a:ext cx="6430291" cy="2217612"/>
+            <a:off x="1968300" y="387133"/>
+            <a:ext cx="8255400" cy="4475081"/>
+          </a:xfrm>
+          <a:prstGeom prst="rect">
+            <a:avLst/>
+          </a:prstGeom>
+        </p:spPr>
+      </p:pic>
+      <p:pic>
+        <p:nvPicPr>
+          <p:cNvPr id="7" name="Picture 6">
+            <a:extLst>
+              <a:ext uri="{FF2B5EF4-FFF2-40B4-BE49-F238E27FC236}">
+                <a16:creationId xmlns:a16="http://schemas.microsoft.com/office/drawing/2014/main" id="{9AFC7ABF-4354-527A-AA77-3D407E2C4A74}"/>
+              </a:ext>
+            </a:extLst>
+          </p:cNvPr>
+          <p:cNvPicPr>
+            <a:picLocks noChangeAspect="1"/>
+          </p:cNvPicPr>
+          <p:nvPr/>
+        </p:nvPicPr>
+        <p:blipFill>
+          <a:blip r:embed="rId3"/>
+          <a:stretch>
+            <a:fillRect/>
+          </a:stretch>
+        </p:blipFill>
+        <p:spPr>
+          <a:xfrm>
+            <a:off x="2529531" y="4944201"/>
+            <a:ext cx="7132938" cy="1455546"/>
           </a:xfrm>
           <a:prstGeom prst="rect">
             <a:avLst/>
@@ -5818,7 +5164,7 @@
     </p:spTree>
     <p:extLst>
       <p:ext uri="{BB962C8B-B14F-4D97-AF65-F5344CB8AC3E}">
-        <p14:creationId xmlns:p14="http://schemas.microsoft.com/office/powerpoint/2010/main" val="1337433928"/>
+        <p14:creationId xmlns:p14="http://schemas.microsoft.com/office/powerpoint/2010/main" val="4276222085"/>
       </p:ext>
     </p:extLst>
   </p:cSld>
@@ -5845,40 +5191,12 @@
           <a:chExt cx="0" cy="0"/>
         </a:xfrm>
       </p:grpSpPr>
-      <p:sp>
-        <p:nvSpPr>
-          <p:cNvPr id="2" name="Title 1">
-            <a:extLst>
-              <a:ext uri="{FF2B5EF4-FFF2-40B4-BE49-F238E27FC236}">
-                <a16:creationId xmlns:a16="http://schemas.microsoft.com/office/drawing/2014/main" id="{717114C5-A6FF-4070-A155-C5B2EB3967C5}"/>
-              </a:ext>
-            </a:extLst>
-          </p:cNvPr>
-          <p:cNvSpPr>
-            <a:spLocks noGrp="1"/>
-          </p:cNvSpPr>
-          <p:nvPr>
-            <p:ph type="title"/>
-          </p:nvPr>
-        </p:nvSpPr>
-        <p:spPr/>
-        <p:txBody>
-          <a:bodyPr/>
-          <a:lstStyle/>
-          <a:p>
-            <a:r>
-              <a:rPr lang="en-PH" dirty="0"/>
-              <a:t>Data pre-processing</a:t>
-            </a:r>
-          </a:p>
-        </p:txBody>
-      </p:sp>
       <p:pic>
         <p:nvPicPr>
           <p:cNvPr id="5" name="Picture 4">
             <a:extLst>
               <a:ext uri="{FF2B5EF4-FFF2-40B4-BE49-F238E27FC236}">
-                <a16:creationId xmlns:a16="http://schemas.microsoft.com/office/drawing/2014/main" id="{C1CAF79C-C0AB-1122-EA28-33A1771A7761}"/>
+                <a16:creationId xmlns:a16="http://schemas.microsoft.com/office/drawing/2014/main" id="{295708D7-925F-796F-6515-66ABFF5A87BB}"/>
               </a:ext>
             </a:extLst>
           </p:cNvPr>
@@ -5887,15 +5205,16 @@
           </p:cNvPicPr>
           <p:nvPr/>
         </p:nvPicPr>
-        <p:blipFill rotWithShape="1">
+        <p:blipFill>
           <a:blip r:embed="rId2"/>
-          <a:srcRect b="1115"/>
-          <a:stretch/>
+          <a:stretch>
+            <a:fillRect/>
+          </a:stretch>
         </p:blipFill>
         <p:spPr>
           <a:xfrm>
-            <a:off x="708462" y="1471727"/>
-            <a:ext cx="4557155" cy="4634433"/>
+            <a:off x="295586" y="217013"/>
+            <a:ext cx="7475868" cy="3619814"/>
           </a:xfrm>
           <a:prstGeom prst="rect">
             <a:avLst/>
@@ -5907,7 +5226,7 @@
           <p:cNvPr id="7" name="Picture 6">
             <a:extLst>
               <a:ext uri="{FF2B5EF4-FFF2-40B4-BE49-F238E27FC236}">
-                <a16:creationId xmlns:a16="http://schemas.microsoft.com/office/drawing/2014/main" id="{C7815382-AFF8-74EB-6B51-CDF82AF464C1}"/>
+                <a16:creationId xmlns:a16="http://schemas.microsoft.com/office/drawing/2014/main" id="{754AF4FE-A6AB-A4F0-C878-4BAE73E2F9FF}"/>
               </a:ext>
             </a:extLst>
           </p:cNvPr>
@@ -5924,8 +5243,8 @@
         </p:blipFill>
         <p:spPr>
           <a:xfrm>
-            <a:off x="5987796" y="1634808"/>
-            <a:ext cx="5845047" cy="4130398"/>
+            <a:off x="6834921" y="4560547"/>
+            <a:ext cx="5044877" cy="2080440"/>
           </a:xfrm>
           <a:prstGeom prst="rect">
             <a:avLst/>
@@ -5935,7 +5254,7 @@
     </p:spTree>
     <p:extLst>
       <p:ext uri="{BB962C8B-B14F-4D97-AF65-F5344CB8AC3E}">
-        <p14:creationId xmlns:p14="http://schemas.microsoft.com/office/powerpoint/2010/main" val="1239802338"/>
+        <p14:creationId xmlns:p14="http://schemas.microsoft.com/office/powerpoint/2010/main" val="2606317837"/>
       </p:ext>
     </p:extLst>
   </p:cSld>
@@ -5962,40 +5281,12 @@
           <a:chExt cx="0" cy="0"/>
         </a:xfrm>
       </p:grpSpPr>
-      <p:sp>
-        <p:nvSpPr>
-          <p:cNvPr id="2" name="Title 1">
-            <a:extLst>
-              <a:ext uri="{FF2B5EF4-FFF2-40B4-BE49-F238E27FC236}">
-                <a16:creationId xmlns:a16="http://schemas.microsoft.com/office/drawing/2014/main" id="{717114C5-A6FF-4070-A155-C5B2EB3967C5}"/>
-              </a:ext>
-            </a:extLst>
-          </p:cNvPr>
-          <p:cNvSpPr>
-            <a:spLocks noGrp="1"/>
-          </p:cNvSpPr>
-          <p:nvPr>
-            <p:ph type="title"/>
-          </p:nvPr>
-        </p:nvSpPr>
-        <p:spPr/>
-        <p:txBody>
-          <a:bodyPr/>
-          <a:lstStyle/>
-          <a:p>
-            <a:r>
-              <a:rPr lang="en-PH" dirty="0"/>
-              <a:t>Data pre-processing</a:t>
-            </a:r>
-          </a:p>
-        </p:txBody>
-      </p:sp>
       <p:pic>
         <p:nvPicPr>
-          <p:cNvPr id="4" name="Picture 3">
-            <a:extLst>
-              <a:ext uri="{FF2B5EF4-FFF2-40B4-BE49-F238E27FC236}">
-                <a16:creationId xmlns:a16="http://schemas.microsoft.com/office/drawing/2014/main" id="{F2C9D02C-D787-1BD6-1906-9C428D6691AA}"/>
+          <p:cNvPr id="5" name="Picture 4">
+            <a:extLst>
+              <a:ext uri="{FF2B5EF4-FFF2-40B4-BE49-F238E27FC236}">
+                <a16:creationId xmlns:a16="http://schemas.microsoft.com/office/drawing/2014/main" id="{ED4BA3C7-CEAB-3FA2-85A7-4E36E94B97D0}"/>
               </a:ext>
             </a:extLst>
           </p:cNvPr>
@@ -6012,8 +5303,38 @@
         </p:blipFill>
         <p:spPr>
           <a:xfrm>
-            <a:off x="957349" y="1569551"/>
-            <a:ext cx="5319221" cy="3901778"/>
+            <a:off x="209227" y="150974"/>
+            <a:ext cx="7445385" cy="3589331"/>
+          </a:xfrm>
+          <a:prstGeom prst="rect">
+            <a:avLst/>
+          </a:prstGeom>
+        </p:spPr>
+      </p:pic>
+      <p:pic>
+        <p:nvPicPr>
+          <p:cNvPr id="7" name="Picture 6">
+            <a:extLst>
+              <a:ext uri="{FF2B5EF4-FFF2-40B4-BE49-F238E27FC236}">
+                <a16:creationId xmlns:a16="http://schemas.microsoft.com/office/drawing/2014/main" id="{B18BF684-82AA-6DE6-A0EF-0C0D117889D3}"/>
+              </a:ext>
+            </a:extLst>
+          </p:cNvPr>
+          <p:cNvPicPr>
+            <a:picLocks noChangeAspect="1"/>
+          </p:cNvPicPr>
+          <p:nvPr/>
+        </p:nvPicPr>
+        <p:blipFill>
+          <a:blip r:embed="rId3"/>
+          <a:stretch>
+            <a:fillRect/>
+          </a:stretch>
+        </p:blipFill>
+        <p:spPr>
+          <a:xfrm>
+            <a:off x="7190534" y="4664689"/>
+            <a:ext cx="4740051" cy="2042337"/>
           </a:xfrm>
           <a:prstGeom prst="rect">
             <a:avLst/>
@@ -6023,7 +5344,7 @@
     </p:spTree>
     <p:extLst>
       <p:ext uri="{BB962C8B-B14F-4D97-AF65-F5344CB8AC3E}">
-        <p14:creationId xmlns:p14="http://schemas.microsoft.com/office/powerpoint/2010/main" val="3503539745"/>
+        <p14:creationId xmlns:p14="http://schemas.microsoft.com/office/powerpoint/2010/main" val="2967904661"/>
       </p:ext>
     </p:extLst>
   </p:cSld>

</xml_diff>

<commit_message>
Added 1 page on ppt, and implemented SVM for training
</commit_message>
<xml_diff>
--- a/Documentation.pptx
+++ b/Documentation.pptx
@@ -25,6 +25,7 @@
     <p:sldId id="295" r:id="rId19"/>
     <p:sldId id="296" r:id="rId20"/>
     <p:sldId id="298" r:id="rId21"/>
+    <p:sldId id="299" r:id="rId22"/>
   </p:sldIdLst>
   <p:sldSz cx="12192000" cy="6858000"/>
   <p:notesSz cx="6858000" cy="9144000"/>
@@ -160,6 +161,7 @@
             <p14:sldId id="295"/>
             <p14:sldId id="296"/>
             <p14:sldId id="298"/>
+            <p14:sldId id="299"/>
           </p14:sldIdLst>
         </p14:section>
       </p14:sectionLst>
@@ -169,6 +171,59 @@
     </p:ext>
   </p:extLst>
 </p:presentation>
+</file>
+
+<file path=ppt/changesInfos/changesInfo1.xml><?xml version="1.0" encoding="utf-8"?>
+<pc:chgInfo xmlns:a="http://schemas.openxmlformats.org/drawingml/2006/main" xmlns:r="http://schemas.openxmlformats.org/officeDocument/2006/relationships" xmlns:ac="http://schemas.microsoft.com/office/drawing/2013/main/command" xmlns:pc="http://schemas.microsoft.com/office/powerpoint/2013/main/command">
+  <pc:docChgLst>
+    <pc:chgData name="Kevin Wong" userId="3648d69958ba4a4a" providerId="LiveId" clId="{84987C48-2C28-433C-ACDD-8B18CFD0C856}"/>
+    <pc:docChg chg="addSld modSld modSection">
+      <pc:chgData name="Kevin Wong" userId="3648d69958ba4a4a" providerId="LiveId" clId="{84987C48-2C28-433C-ACDD-8B18CFD0C856}" dt="2024-03-26T20:51:20.123" v="8" actId="1076"/>
+      <pc:docMkLst>
+        <pc:docMk/>
+      </pc:docMkLst>
+      <pc:sldChg chg="addSp delSp modSp new mod">
+        <pc:chgData name="Kevin Wong" userId="3648d69958ba4a4a" providerId="LiveId" clId="{84987C48-2C28-433C-ACDD-8B18CFD0C856}" dt="2024-03-26T20:51:20.123" v="8" actId="1076"/>
+        <pc:sldMkLst>
+          <pc:docMk/>
+          <pc:sldMk cId="1760257253" sldId="299"/>
+        </pc:sldMkLst>
+        <pc:spChg chg="del">
+          <ac:chgData name="Kevin Wong" userId="3648d69958ba4a4a" providerId="LiveId" clId="{84987C48-2C28-433C-ACDD-8B18CFD0C856}" dt="2024-03-26T20:50:59.344" v="3" actId="22"/>
+          <ac:spMkLst>
+            <pc:docMk/>
+            <pc:sldMk cId="1760257253" sldId="299"/>
+            <ac:spMk id="3" creationId="{FE9ECBD0-56D4-B853-948A-5CF83DEB3D00}"/>
+          </ac:spMkLst>
+        </pc:spChg>
+        <pc:picChg chg="add mod">
+          <ac:chgData name="Kevin Wong" userId="3648d69958ba4a4a" providerId="LiveId" clId="{84987C48-2C28-433C-ACDD-8B18CFD0C856}" dt="2024-03-26T20:51:01.412" v="4" actId="1076"/>
+          <ac:picMkLst>
+            <pc:docMk/>
+            <pc:sldMk cId="1760257253" sldId="299"/>
+            <ac:picMk id="5" creationId="{1DEEC450-6E34-6EC8-8E62-34F33D4C7E36}"/>
+          </ac:picMkLst>
+        </pc:picChg>
+        <pc:picChg chg="add mod ord">
+          <ac:chgData name="Kevin Wong" userId="3648d69958ba4a4a" providerId="LiveId" clId="{84987C48-2C28-433C-ACDD-8B18CFD0C856}" dt="2024-03-26T20:51:20.123" v="8" actId="1076"/>
+          <ac:picMkLst>
+            <pc:docMk/>
+            <pc:sldMk cId="1760257253" sldId="299"/>
+            <ac:picMk id="7" creationId="{4EB6CDA7-AB5C-DD4B-A438-5C52F7404DAB}"/>
+          </ac:picMkLst>
+        </pc:picChg>
+        <pc:picChg chg="add mod">
+          <ac:chgData name="Kevin Wong" userId="3648d69958ba4a4a" providerId="LiveId" clId="{84987C48-2C28-433C-ACDD-8B18CFD0C856}" dt="2024-03-26T20:51:18.759" v="7" actId="1076"/>
+          <ac:picMkLst>
+            <pc:docMk/>
+            <pc:sldMk cId="1760257253" sldId="299"/>
+            <ac:picMk id="9" creationId="{9CF7AD40-CBEE-A411-3CC2-C315ADB436E1}"/>
+          </ac:picMkLst>
+        </pc:picChg>
+      </pc:sldChg>
+    </pc:docChg>
+  </pc:docChgLst>
+</pc:chgInfo>
 </file>
 
 <file path=ppt/slideLayouts/slideLayout1.xml><?xml version="1.0" encoding="utf-8"?>
@@ -320,7 +375,7 @@
           <a:p>
             <a:fld id="{16D657CA-F8EC-4C87-9515-8E77A9C1CB63}" type="datetimeFigureOut">
               <a:rPr lang="en-PH" smtClean="0"/>
-              <a:t>21/03/2024</a:t>
+              <a:t>26/03/2024</a:t>
             </a:fld>
             <a:endParaRPr lang="en-PH"/>
           </a:p>
@@ -520,7 +575,7 @@
           <a:p>
             <a:fld id="{16D657CA-F8EC-4C87-9515-8E77A9C1CB63}" type="datetimeFigureOut">
               <a:rPr lang="en-PH" smtClean="0"/>
-              <a:t>21/03/2024</a:t>
+              <a:t>26/03/2024</a:t>
             </a:fld>
             <a:endParaRPr lang="en-PH"/>
           </a:p>
@@ -730,7 +785,7 @@
           <a:p>
             <a:fld id="{16D657CA-F8EC-4C87-9515-8E77A9C1CB63}" type="datetimeFigureOut">
               <a:rPr lang="en-PH" smtClean="0"/>
-              <a:t>21/03/2024</a:t>
+              <a:t>26/03/2024</a:t>
             </a:fld>
             <a:endParaRPr lang="en-PH"/>
           </a:p>
@@ -930,7 +985,7 @@
           <a:p>
             <a:fld id="{16D657CA-F8EC-4C87-9515-8E77A9C1CB63}" type="datetimeFigureOut">
               <a:rPr lang="en-PH" smtClean="0"/>
-              <a:t>21/03/2024</a:t>
+              <a:t>26/03/2024</a:t>
             </a:fld>
             <a:endParaRPr lang="en-PH"/>
           </a:p>
@@ -1206,7 +1261,7 @@
           <a:p>
             <a:fld id="{16D657CA-F8EC-4C87-9515-8E77A9C1CB63}" type="datetimeFigureOut">
               <a:rPr lang="en-PH" smtClean="0"/>
-              <a:t>21/03/2024</a:t>
+              <a:t>26/03/2024</a:t>
             </a:fld>
             <a:endParaRPr lang="en-PH"/>
           </a:p>
@@ -1474,7 +1529,7 @@
           <a:p>
             <a:fld id="{16D657CA-F8EC-4C87-9515-8E77A9C1CB63}" type="datetimeFigureOut">
               <a:rPr lang="en-PH" smtClean="0"/>
-              <a:t>21/03/2024</a:t>
+              <a:t>26/03/2024</a:t>
             </a:fld>
             <a:endParaRPr lang="en-PH"/>
           </a:p>
@@ -1889,7 +1944,7 @@
           <a:p>
             <a:fld id="{16D657CA-F8EC-4C87-9515-8E77A9C1CB63}" type="datetimeFigureOut">
               <a:rPr lang="en-PH" smtClean="0"/>
-              <a:t>21/03/2024</a:t>
+              <a:t>26/03/2024</a:t>
             </a:fld>
             <a:endParaRPr lang="en-PH"/>
           </a:p>
@@ -2031,7 +2086,7 @@
           <a:p>
             <a:fld id="{16D657CA-F8EC-4C87-9515-8E77A9C1CB63}" type="datetimeFigureOut">
               <a:rPr lang="en-PH" smtClean="0"/>
-              <a:t>21/03/2024</a:t>
+              <a:t>26/03/2024</a:t>
             </a:fld>
             <a:endParaRPr lang="en-PH"/>
           </a:p>
@@ -2144,7 +2199,7 @@
           <a:p>
             <a:fld id="{16D657CA-F8EC-4C87-9515-8E77A9C1CB63}" type="datetimeFigureOut">
               <a:rPr lang="en-PH" smtClean="0"/>
-              <a:t>21/03/2024</a:t>
+              <a:t>26/03/2024</a:t>
             </a:fld>
             <a:endParaRPr lang="en-PH"/>
           </a:p>
@@ -2457,7 +2512,7 @@
           <a:p>
             <a:fld id="{16D657CA-F8EC-4C87-9515-8E77A9C1CB63}" type="datetimeFigureOut">
               <a:rPr lang="en-PH" smtClean="0"/>
-              <a:t>21/03/2024</a:t>
+              <a:t>26/03/2024</a:t>
             </a:fld>
             <a:endParaRPr lang="en-PH"/>
           </a:p>
@@ -2746,7 +2801,7 @@
           <a:p>
             <a:fld id="{16D657CA-F8EC-4C87-9515-8E77A9C1CB63}" type="datetimeFigureOut">
               <a:rPr lang="en-PH" smtClean="0"/>
-              <a:t>21/03/2024</a:t>
+              <a:t>26/03/2024</a:t>
             </a:fld>
             <a:endParaRPr lang="en-PH"/>
           </a:p>
@@ -2989,7 +3044,7 @@
           <a:p>
             <a:fld id="{16D657CA-F8EC-4C87-9515-8E77A9C1CB63}" type="datetimeFigureOut">
               <a:rPr lang="en-PH" smtClean="0"/>
-              <a:t>21/03/2024</a:t>
+              <a:t>26/03/2024</a:t>
             </a:fld>
             <a:endParaRPr lang="en-PH"/>
           </a:p>
@@ -4704,6 +4759,150 @@
     <p:extLst>
       <p:ext uri="{BB962C8B-B14F-4D97-AF65-F5344CB8AC3E}">
         <p14:creationId xmlns:p14="http://schemas.microsoft.com/office/powerpoint/2010/main" val="2132193655"/>
+      </p:ext>
+    </p:extLst>
+  </p:cSld>
+  <p:clrMapOvr>
+    <a:masterClrMapping/>
+  </p:clrMapOvr>
+</p:sld>
+</file>
+
+<file path=ppt/slides/slide21.xml><?xml version="1.0" encoding="utf-8"?>
+<p:sld xmlns:a="http://schemas.openxmlformats.org/drawingml/2006/main" xmlns:r="http://schemas.openxmlformats.org/officeDocument/2006/relationships" xmlns:p="http://schemas.openxmlformats.org/presentationml/2006/main">
+  <p:cSld>
+    <p:spTree>
+      <p:nvGrpSpPr>
+        <p:cNvPr id="1" name=""/>
+        <p:cNvGrpSpPr/>
+        <p:nvPr/>
+      </p:nvGrpSpPr>
+      <p:grpSpPr>
+        <a:xfrm>
+          <a:off x="0" y="0"/>
+          <a:ext cx="0" cy="0"/>
+          <a:chOff x="0" y="0"/>
+          <a:chExt cx="0" cy="0"/>
+        </a:xfrm>
+      </p:grpSpPr>
+      <p:sp>
+        <p:nvSpPr>
+          <p:cNvPr id="2" name="Title 1">
+            <a:extLst>
+              <a:ext uri="{FF2B5EF4-FFF2-40B4-BE49-F238E27FC236}">
+                <a16:creationId xmlns:a16="http://schemas.microsoft.com/office/drawing/2014/main" id="{4B6B226E-AD89-721A-30B4-F0B8FA56285E}"/>
+              </a:ext>
+            </a:extLst>
+          </p:cNvPr>
+          <p:cNvSpPr>
+            <a:spLocks noGrp="1"/>
+          </p:cNvSpPr>
+          <p:nvPr>
+            <p:ph type="title"/>
+          </p:nvPr>
+        </p:nvSpPr>
+        <p:spPr/>
+        <p:txBody>
+          <a:bodyPr/>
+          <a:lstStyle/>
+          <a:p>
+            <a:endParaRPr lang="en-HK"/>
+          </a:p>
+        </p:txBody>
+      </p:sp>
+      <p:pic>
+        <p:nvPicPr>
+          <p:cNvPr id="7" name="Content Placeholder 6">
+            <a:extLst>
+              <a:ext uri="{FF2B5EF4-FFF2-40B4-BE49-F238E27FC236}">
+                <a16:creationId xmlns:a16="http://schemas.microsoft.com/office/drawing/2014/main" id="{4EB6CDA7-AB5C-DD4B-A438-5C52F7404DAB}"/>
+              </a:ext>
+            </a:extLst>
+          </p:cNvPr>
+          <p:cNvPicPr>
+            <a:picLocks noGrp="1" noChangeAspect="1"/>
+          </p:cNvPicPr>
+          <p:nvPr>
+            <p:ph idx="1"/>
+          </p:nvPr>
+        </p:nvPicPr>
+        <p:blipFill>
+          <a:blip r:embed="rId2"/>
+          <a:stretch>
+            <a:fillRect/>
+          </a:stretch>
+        </p:blipFill>
+        <p:spPr>
+          <a:xfrm>
+            <a:off x="6992165" y="2828961"/>
+            <a:ext cx="3057952" cy="1657581"/>
+          </a:xfrm>
+        </p:spPr>
+      </p:pic>
+      <p:pic>
+        <p:nvPicPr>
+          <p:cNvPr id="5" name="Picture 4">
+            <a:extLst>
+              <a:ext uri="{FF2B5EF4-FFF2-40B4-BE49-F238E27FC236}">
+                <a16:creationId xmlns:a16="http://schemas.microsoft.com/office/drawing/2014/main" id="{1DEEC450-6E34-6EC8-8E62-34F33D4C7E36}"/>
+              </a:ext>
+            </a:extLst>
+          </p:cNvPr>
+          <p:cNvPicPr>
+            <a:picLocks noChangeAspect="1"/>
+          </p:cNvPicPr>
+          <p:nvPr/>
+        </p:nvPicPr>
+        <p:blipFill>
+          <a:blip r:embed="rId3"/>
+          <a:stretch>
+            <a:fillRect/>
+          </a:stretch>
+        </p:blipFill>
+        <p:spPr>
+          <a:xfrm>
+            <a:off x="208202" y="161326"/>
+            <a:ext cx="6211167" cy="5315692"/>
+          </a:xfrm>
+          <a:prstGeom prst="rect">
+            <a:avLst/>
+          </a:prstGeom>
+        </p:spPr>
+      </p:pic>
+      <p:pic>
+        <p:nvPicPr>
+          <p:cNvPr id="9" name="Picture 8">
+            <a:extLst>
+              <a:ext uri="{FF2B5EF4-FFF2-40B4-BE49-F238E27FC236}">
+                <a16:creationId xmlns:a16="http://schemas.microsoft.com/office/drawing/2014/main" id="{9CF7AD40-CBEE-A411-3CC2-C315ADB436E1}"/>
+              </a:ext>
+            </a:extLst>
+          </p:cNvPr>
+          <p:cNvPicPr>
+            <a:picLocks noChangeAspect="1"/>
+          </p:cNvPicPr>
+          <p:nvPr/>
+        </p:nvPicPr>
+        <p:blipFill>
+          <a:blip r:embed="rId4"/>
+          <a:stretch>
+            <a:fillRect/>
+          </a:stretch>
+        </p:blipFill>
+        <p:spPr>
+          <a:xfrm>
+            <a:off x="6992165" y="1503398"/>
+            <a:ext cx="2562583" cy="1114581"/>
+          </a:xfrm>
+          <a:prstGeom prst="rect">
+            <a:avLst/>
+          </a:prstGeom>
+        </p:spPr>
+      </p:pic>
+    </p:spTree>
+    <p:extLst>
+      <p:ext uri="{BB962C8B-B14F-4D97-AF65-F5344CB8AC3E}">
+        <p14:creationId xmlns:p14="http://schemas.microsoft.com/office/powerpoint/2010/main" val="1760257253"/>
       </p:ext>
     </p:extLst>
   </p:cSld>

</xml_diff>